<commit_message>
adding chapter 6 dictionary images
</commit_message>
<xml_diff>
--- a/assets/diagrams_pool.pptx
+++ b/assets/diagrams_pool.pptx
@@ -20,6 +20,7 @@
     <p:sldId id="269" r:id="rId14"/>
     <p:sldId id="270" r:id="rId15"/>
     <p:sldId id="271" r:id="rId16"/>
+    <p:sldId id="272" r:id="rId17"/>
   </p:sldIdLst>
   <p:sldSz cx="12192000" cy="6858000"/>
   <p:notesSz cx="7315200" cy="9601200"/>
@@ -273,7 +274,7 @@
           <a:p>
             <a:fld id="{CA113627-5753-4E5F-853E-B64920B5A820}" type="datetimeFigureOut">
               <a:rPr lang="en-US" smtClean="0"/>
-              <a:t>11/27/2024</a:t>
+              <a:t>12/1/2024</a:t>
             </a:fld>
             <a:endParaRPr lang="en-US"/>
           </a:p>
@@ -471,7 +472,7 @@
           <a:p>
             <a:fld id="{CA113627-5753-4E5F-853E-B64920B5A820}" type="datetimeFigureOut">
               <a:rPr lang="en-US" smtClean="0"/>
-              <a:t>11/27/2024</a:t>
+              <a:t>12/1/2024</a:t>
             </a:fld>
             <a:endParaRPr lang="en-US"/>
           </a:p>
@@ -679,7 +680,7 @@
           <a:p>
             <a:fld id="{CA113627-5753-4E5F-853E-B64920B5A820}" type="datetimeFigureOut">
               <a:rPr lang="en-US" smtClean="0"/>
-              <a:t>11/27/2024</a:t>
+              <a:t>12/1/2024</a:t>
             </a:fld>
             <a:endParaRPr lang="en-US"/>
           </a:p>
@@ -877,7 +878,7 @@
           <a:p>
             <a:fld id="{CA113627-5753-4E5F-853E-B64920B5A820}" type="datetimeFigureOut">
               <a:rPr lang="en-US" smtClean="0"/>
-              <a:t>11/27/2024</a:t>
+              <a:t>12/1/2024</a:t>
             </a:fld>
             <a:endParaRPr lang="en-US"/>
           </a:p>
@@ -1152,7 +1153,7 @@
           <a:p>
             <a:fld id="{CA113627-5753-4E5F-853E-B64920B5A820}" type="datetimeFigureOut">
               <a:rPr lang="en-US" smtClean="0"/>
-              <a:t>11/27/2024</a:t>
+              <a:t>12/1/2024</a:t>
             </a:fld>
             <a:endParaRPr lang="en-US"/>
           </a:p>
@@ -1417,7 +1418,7 @@
           <a:p>
             <a:fld id="{CA113627-5753-4E5F-853E-B64920B5A820}" type="datetimeFigureOut">
               <a:rPr lang="en-US" smtClean="0"/>
-              <a:t>11/27/2024</a:t>
+              <a:t>12/1/2024</a:t>
             </a:fld>
             <a:endParaRPr lang="en-US"/>
           </a:p>
@@ -1829,7 +1830,7 @@
           <a:p>
             <a:fld id="{CA113627-5753-4E5F-853E-B64920B5A820}" type="datetimeFigureOut">
               <a:rPr lang="en-US" smtClean="0"/>
-              <a:t>11/27/2024</a:t>
+              <a:t>12/1/2024</a:t>
             </a:fld>
             <a:endParaRPr lang="en-US"/>
           </a:p>
@@ -1970,7 +1971,7 @@
           <a:p>
             <a:fld id="{CA113627-5753-4E5F-853E-B64920B5A820}" type="datetimeFigureOut">
               <a:rPr lang="en-US" smtClean="0"/>
-              <a:t>11/27/2024</a:t>
+              <a:t>12/1/2024</a:t>
             </a:fld>
             <a:endParaRPr lang="en-US"/>
           </a:p>
@@ -2083,7 +2084,7 @@
           <a:p>
             <a:fld id="{CA113627-5753-4E5F-853E-B64920B5A820}" type="datetimeFigureOut">
               <a:rPr lang="en-US" smtClean="0"/>
-              <a:t>11/27/2024</a:t>
+              <a:t>12/1/2024</a:t>
             </a:fld>
             <a:endParaRPr lang="en-US"/>
           </a:p>
@@ -2394,7 +2395,7 @@
           <a:p>
             <a:fld id="{CA113627-5753-4E5F-853E-B64920B5A820}" type="datetimeFigureOut">
               <a:rPr lang="en-US" smtClean="0"/>
-              <a:t>11/27/2024</a:t>
+              <a:t>12/1/2024</a:t>
             </a:fld>
             <a:endParaRPr lang="en-US"/>
           </a:p>
@@ -2682,7 +2683,7 @@
           <a:p>
             <a:fld id="{CA113627-5753-4E5F-853E-B64920B5A820}" type="datetimeFigureOut">
               <a:rPr lang="en-US" smtClean="0"/>
-              <a:t>11/27/2024</a:t>
+              <a:t>12/1/2024</a:t>
             </a:fld>
             <a:endParaRPr lang="en-US"/>
           </a:p>
@@ -2923,7 +2924,7 @@
           <a:p>
             <a:fld id="{CA113627-5753-4E5F-853E-B64920B5A820}" type="datetimeFigureOut">
               <a:rPr lang="en-US" smtClean="0"/>
-              <a:t>11/27/2024</a:t>
+              <a:t>12/1/2024</a:t>
             </a:fld>
             <a:endParaRPr lang="en-US"/>
           </a:p>
@@ -13052,6 +13053,552 @@
 </p:sld>
 </file>
 
+<file path=ppt/slides/slide16.xml><?xml version="1.0" encoding="utf-8"?>
+<p:sld xmlns:a="http://schemas.openxmlformats.org/drawingml/2006/main" xmlns:r="http://schemas.openxmlformats.org/officeDocument/2006/relationships" xmlns:p="http://schemas.openxmlformats.org/presentationml/2006/main">
+  <p:cSld>
+    <p:spTree>
+      <p:nvGrpSpPr>
+        <p:cNvPr id="1" name="">
+          <a:extLst>
+            <a:ext uri="{FF2B5EF4-FFF2-40B4-BE49-F238E27FC236}">
+              <a16:creationId xmlns:a16="http://schemas.microsoft.com/office/drawing/2014/main" id="{97E78762-1FFD-78DF-00FB-490007097AAF}"/>
+            </a:ext>
+          </a:extLst>
+        </p:cNvPr>
+        <p:cNvGrpSpPr/>
+        <p:nvPr/>
+      </p:nvGrpSpPr>
+      <p:grpSpPr>
+        <a:xfrm>
+          <a:off x="0" y="0"/>
+          <a:ext cx="0" cy="0"/>
+          <a:chOff x="0" y="0"/>
+          <a:chExt cx="0" cy="0"/>
+        </a:xfrm>
+      </p:grpSpPr>
+      <p:sp>
+        <p:nvSpPr>
+          <p:cNvPr id="58" name="TextBox 57">
+            <a:extLst>
+              <a:ext uri="{FF2B5EF4-FFF2-40B4-BE49-F238E27FC236}">
+                <a16:creationId xmlns:a16="http://schemas.microsoft.com/office/drawing/2014/main" id="{A473A7DA-E60B-3F98-D4AA-9C175BCD026D}"/>
+              </a:ext>
+            </a:extLst>
+          </p:cNvPr>
+          <p:cNvSpPr txBox="1"/>
+          <p:nvPr/>
+        </p:nvSpPr>
+        <p:spPr>
+          <a:xfrm>
+            <a:off x="1525310" y="5983884"/>
+            <a:ext cx="7928523" cy="461665"/>
+          </a:xfrm>
+          <a:prstGeom prst="rect">
+            <a:avLst/>
+          </a:prstGeom>
+          <a:noFill/>
+        </p:spPr>
+        <p:txBody>
+          <a:bodyPr wrap="square" rtlCol="0">
+            <a:spAutoFit/>
+          </a:bodyPr>
+          <a:lstStyle/>
+          <a:p>
+            <a:r>
+              <a:rPr lang="en-US" sz="2400" b="1" dirty="0"/>
+              <a:t>Fig.</a:t>
+            </a:r>
+            <a:r>
+              <a:rPr lang="en-US" sz="2400" dirty="0"/>
+              <a:t> 6.1 shows definition of key (words) from a dictionary</a:t>
+            </a:r>
+          </a:p>
+        </p:txBody>
+      </p:sp>
+      <p:grpSp>
+        <p:nvGrpSpPr>
+          <p:cNvPr id="45" name="Group 44">
+            <a:extLst>
+              <a:ext uri="{FF2B5EF4-FFF2-40B4-BE49-F238E27FC236}">
+                <a16:creationId xmlns:a16="http://schemas.microsoft.com/office/drawing/2014/main" id="{4D0CC57C-51FD-AF36-3511-3321489A53A4}"/>
+              </a:ext>
+            </a:extLst>
+          </p:cNvPr>
+          <p:cNvGrpSpPr/>
+          <p:nvPr/>
+        </p:nvGrpSpPr>
+        <p:grpSpPr>
+          <a:xfrm>
+            <a:off x="590768" y="412451"/>
+            <a:ext cx="8863065" cy="5185543"/>
+            <a:chOff x="285968" y="981411"/>
+            <a:chExt cx="8863065" cy="5185543"/>
+          </a:xfrm>
+        </p:grpSpPr>
+        <p:pic>
+          <p:nvPicPr>
+            <p:cNvPr id="26" name="Picture 25">
+              <a:extLst>
+                <a:ext uri="{FF2B5EF4-FFF2-40B4-BE49-F238E27FC236}">
+                  <a16:creationId xmlns:a16="http://schemas.microsoft.com/office/drawing/2014/main" id="{7FEDB00F-D26B-18BC-F9B7-C2DB71BB7758}"/>
+                </a:ext>
+              </a:extLst>
+            </p:cNvPr>
+            <p:cNvPicPr>
+              <a:picLocks noChangeAspect="1"/>
+            </p:cNvPicPr>
+            <p:nvPr/>
+          </p:nvPicPr>
+          <p:blipFill>
+            <a:blip r:embed="rId2"/>
+            <a:stretch>
+              <a:fillRect/>
+            </a:stretch>
+          </p:blipFill>
+          <p:spPr>
+            <a:xfrm>
+              <a:off x="1877372" y="981411"/>
+              <a:ext cx="6838950" cy="2181225"/>
+            </a:xfrm>
+            <a:prstGeom prst="rect">
+              <a:avLst/>
+            </a:prstGeom>
+          </p:spPr>
+        </p:pic>
+        <p:grpSp>
+          <p:nvGrpSpPr>
+            <p:cNvPr id="17" name="Group 16">
+              <a:extLst>
+                <a:ext uri="{FF2B5EF4-FFF2-40B4-BE49-F238E27FC236}">
+                  <a16:creationId xmlns:a16="http://schemas.microsoft.com/office/drawing/2014/main" id="{CC797F1E-124F-A88F-99E9-87DF003EA49B}"/>
+                </a:ext>
+              </a:extLst>
+            </p:cNvPr>
+            <p:cNvGrpSpPr/>
+            <p:nvPr/>
+          </p:nvGrpSpPr>
+          <p:grpSpPr>
+            <a:xfrm>
+              <a:off x="285968" y="2589699"/>
+              <a:ext cx="8863065" cy="3577255"/>
+              <a:chOff x="-293886" y="1468140"/>
+              <a:chExt cx="8863065" cy="3577255"/>
+            </a:xfrm>
+          </p:grpSpPr>
+          <p:pic>
+            <p:nvPicPr>
+              <p:cNvPr id="7" name="Picture 6">
+                <a:extLst>
+                  <a:ext uri="{FF2B5EF4-FFF2-40B4-BE49-F238E27FC236}">
+                    <a16:creationId xmlns:a16="http://schemas.microsoft.com/office/drawing/2014/main" id="{F6913C2E-0EF5-3020-A6A0-3C73459A13EE}"/>
+                  </a:ext>
+                </a:extLst>
+              </p:cNvPr>
+              <p:cNvPicPr>
+                <a:picLocks noChangeAspect="1"/>
+              </p:cNvPicPr>
+              <p:nvPr/>
+            </p:nvPicPr>
+            <p:blipFill>
+              <a:blip r:embed="rId3"/>
+              <a:srcRect r="25546" b="26266"/>
+              <a:stretch/>
+            </p:blipFill>
+            <p:spPr>
+              <a:xfrm>
+                <a:off x="1365151" y="2594297"/>
+                <a:ext cx="6630770" cy="2451098"/>
+              </a:xfrm>
+              <a:prstGeom prst="rect">
+                <a:avLst/>
+              </a:prstGeom>
+            </p:spPr>
+          </p:pic>
+          <p:sp>
+            <p:nvSpPr>
+              <p:cNvPr id="8" name="Rectangle 7">
+                <a:extLst>
+                  <a:ext uri="{FF2B5EF4-FFF2-40B4-BE49-F238E27FC236}">
+                    <a16:creationId xmlns:a16="http://schemas.microsoft.com/office/drawing/2014/main" id="{58185251-BDAC-496D-4809-790854EE03FE}"/>
+                  </a:ext>
+                </a:extLst>
+              </p:cNvPr>
+              <p:cNvSpPr/>
+              <p:nvPr/>
+            </p:nvSpPr>
+            <p:spPr>
+              <a:xfrm>
+                <a:off x="1487705" y="4471696"/>
+                <a:ext cx="5075656" cy="573699"/>
+              </a:xfrm>
+              <a:prstGeom prst="rect">
+                <a:avLst/>
+              </a:prstGeom>
+              <a:noFill/>
+              <a:ln w="38100">
+                <a:prstDash val="dash"/>
+              </a:ln>
+            </p:spPr>
+            <p:style>
+              <a:lnRef idx="2">
+                <a:schemeClr val="accent1">
+                  <a:shade val="15000"/>
+                </a:schemeClr>
+              </a:lnRef>
+              <a:fillRef idx="1">
+                <a:schemeClr val="accent1"/>
+              </a:fillRef>
+              <a:effectRef idx="0">
+                <a:schemeClr val="accent1"/>
+              </a:effectRef>
+              <a:fontRef idx="minor">
+                <a:schemeClr val="lt1"/>
+              </a:fontRef>
+            </p:style>
+            <p:txBody>
+              <a:bodyPr rtlCol="0" anchor="ctr"/>
+              <a:lstStyle/>
+              <a:p>
+                <a:pPr algn="ctr"/>
+                <a:endParaRPr lang="en-US"/>
+              </a:p>
+            </p:txBody>
+          </p:sp>
+          <p:cxnSp>
+            <p:nvCxnSpPr>
+              <p:cNvPr id="22" name="Straight Arrow Connector 21">
+                <a:extLst>
+                  <a:ext uri="{FF2B5EF4-FFF2-40B4-BE49-F238E27FC236}">
+                    <a16:creationId xmlns:a16="http://schemas.microsoft.com/office/drawing/2014/main" id="{0A3B5EB3-A6BE-A577-4E0D-437F607576A4}"/>
+                  </a:ext>
+                </a:extLst>
+              </p:cNvPr>
+              <p:cNvCxnSpPr>
+                <a:cxnSpLocks/>
+              </p:cNvCxnSpPr>
+              <p:nvPr/>
+            </p:nvCxnSpPr>
+            <p:spPr>
+              <a:xfrm flipH="1">
+                <a:off x="6563361" y="4762193"/>
+                <a:ext cx="944881" cy="0"/>
+              </a:xfrm>
+              <a:prstGeom prst="straightConnector1">
+                <a:avLst/>
+              </a:prstGeom>
+              <a:ln w="28575">
+                <a:solidFill>
+                  <a:schemeClr val="tx1"/>
+                </a:solidFill>
+                <a:tailEnd type="triangle"/>
+              </a:ln>
+            </p:spPr>
+            <p:style>
+              <a:lnRef idx="1">
+                <a:schemeClr val="accent1"/>
+              </a:lnRef>
+              <a:fillRef idx="0">
+                <a:schemeClr val="accent1"/>
+              </a:fillRef>
+              <a:effectRef idx="0">
+                <a:schemeClr val="accent1"/>
+              </a:effectRef>
+              <a:fontRef idx="minor">
+                <a:schemeClr val="tx1"/>
+              </a:fontRef>
+            </p:style>
+          </p:cxnSp>
+          <p:sp>
+            <p:nvSpPr>
+              <p:cNvPr id="3" name="TextBox 2">
+                <a:extLst>
+                  <a:ext uri="{FF2B5EF4-FFF2-40B4-BE49-F238E27FC236}">
+                    <a16:creationId xmlns:a16="http://schemas.microsoft.com/office/drawing/2014/main" id="{485D4571-4101-4970-A62C-618B732CC4D1}"/>
+                  </a:ext>
+                </a:extLst>
+              </p:cNvPr>
+              <p:cNvSpPr txBox="1"/>
+              <p:nvPr/>
+            </p:nvSpPr>
+            <p:spPr>
+              <a:xfrm>
+                <a:off x="7508242" y="4466637"/>
+                <a:ext cx="1060937" cy="523220"/>
+              </a:xfrm>
+              <a:prstGeom prst="rect">
+                <a:avLst/>
+              </a:prstGeom>
+              <a:noFill/>
+              <a:ln>
+                <a:noFill/>
+              </a:ln>
+            </p:spPr>
+            <p:txBody>
+              <a:bodyPr wrap="square">
+                <a:spAutoFit/>
+              </a:bodyPr>
+              <a:lstStyle/>
+              <a:p>
+                <a:r>
+                  <a:rPr lang="en-US" sz="2800" b="0" i="0" dirty="0">
+                    <a:solidFill>
+                      <a:srgbClr val="000000"/>
+                    </a:solidFill>
+                    <a:effectLst/>
+                  </a:rPr>
+                  <a:t>value</a:t>
+                </a:r>
+              </a:p>
+            </p:txBody>
+          </p:sp>
+          <p:cxnSp>
+            <p:nvCxnSpPr>
+              <p:cNvPr id="11" name="Straight Arrow Connector 10">
+                <a:extLst>
+                  <a:ext uri="{FF2B5EF4-FFF2-40B4-BE49-F238E27FC236}">
+                    <a16:creationId xmlns:a16="http://schemas.microsoft.com/office/drawing/2014/main" id="{5BB41DA7-DEBF-FF5D-5EFC-BF6E94B727E7}"/>
+                  </a:ext>
+                </a:extLst>
+              </p:cNvPr>
+              <p:cNvCxnSpPr>
+                <a:cxnSpLocks/>
+              </p:cNvCxnSpPr>
+              <p:nvPr/>
+            </p:nvCxnSpPr>
+            <p:spPr>
+              <a:xfrm rot="16200000" flipH="1">
+                <a:off x="215479" y="2058521"/>
+                <a:ext cx="2103120" cy="2103120"/>
+              </a:xfrm>
+              <a:prstGeom prst="bentConnector3">
+                <a:avLst>
+                  <a:gd name="adj1" fmla="val 50000"/>
+                </a:avLst>
+              </a:prstGeom>
+              <a:ln w="28575">
+                <a:solidFill>
+                  <a:schemeClr val="tx1"/>
+                </a:solidFill>
+                <a:tailEnd type="triangle"/>
+              </a:ln>
+            </p:spPr>
+            <p:style>
+              <a:lnRef idx="1">
+                <a:schemeClr val="accent1"/>
+              </a:lnRef>
+              <a:fillRef idx="0">
+                <a:schemeClr val="accent1"/>
+              </a:fillRef>
+              <a:effectRef idx="0">
+                <a:schemeClr val="accent1"/>
+              </a:effectRef>
+              <a:fontRef idx="minor">
+                <a:schemeClr val="tx1"/>
+              </a:fontRef>
+            </p:style>
+          </p:cxnSp>
+          <p:sp>
+            <p:nvSpPr>
+              <p:cNvPr id="15" name="TextBox 14">
+                <a:extLst>
+                  <a:ext uri="{FF2B5EF4-FFF2-40B4-BE49-F238E27FC236}">
+                    <a16:creationId xmlns:a16="http://schemas.microsoft.com/office/drawing/2014/main" id="{D73CFE69-3731-143C-DFC3-1CCE0D7307F4}"/>
+                  </a:ext>
+                </a:extLst>
+              </p:cNvPr>
+              <p:cNvSpPr txBox="1"/>
+              <p:nvPr/>
+            </p:nvSpPr>
+            <p:spPr>
+              <a:xfrm>
+                <a:off x="-293886" y="1519820"/>
+                <a:ext cx="1060937" cy="523220"/>
+              </a:xfrm>
+              <a:prstGeom prst="rect">
+                <a:avLst/>
+              </a:prstGeom>
+              <a:noFill/>
+              <a:ln>
+                <a:noFill/>
+              </a:ln>
+            </p:spPr>
+            <p:txBody>
+              <a:bodyPr wrap="square">
+                <a:spAutoFit/>
+              </a:bodyPr>
+              <a:lstStyle/>
+              <a:p>
+                <a:pPr algn="ctr"/>
+                <a:r>
+                  <a:rPr lang="en-US" sz="2800" b="0" i="0" dirty="0">
+                    <a:solidFill>
+                      <a:srgbClr val="000000"/>
+                    </a:solidFill>
+                    <a:effectLst/>
+                  </a:rPr>
+                  <a:t>key</a:t>
+                </a:r>
+              </a:p>
+            </p:txBody>
+          </p:sp>
+          <p:sp>
+            <p:nvSpPr>
+              <p:cNvPr id="30" name="Rectangle 29">
+                <a:extLst>
+                  <a:ext uri="{FF2B5EF4-FFF2-40B4-BE49-F238E27FC236}">
+                    <a16:creationId xmlns:a16="http://schemas.microsoft.com/office/drawing/2014/main" id="{16F8FDFB-BB4B-5FD2-B6BF-9D476A21E802}"/>
+                  </a:ext>
+                </a:extLst>
+              </p:cNvPr>
+              <p:cNvSpPr/>
+              <p:nvPr/>
+            </p:nvSpPr>
+            <p:spPr>
+              <a:xfrm>
+                <a:off x="1700330" y="1710544"/>
+                <a:ext cx="3474720" cy="310042"/>
+              </a:xfrm>
+              <a:prstGeom prst="rect">
+                <a:avLst/>
+              </a:prstGeom>
+              <a:noFill/>
+              <a:ln w="38100">
+                <a:prstDash val="dash"/>
+              </a:ln>
+            </p:spPr>
+            <p:style>
+              <a:lnRef idx="2">
+                <a:schemeClr val="accent1">
+                  <a:shade val="15000"/>
+                </a:schemeClr>
+              </a:lnRef>
+              <a:fillRef idx="1">
+                <a:schemeClr val="accent1"/>
+              </a:fillRef>
+              <a:effectRef idx="0">
+                <a:schemeClr val="accent1"/>
+              </a:effectRef>
+              <a:fontRef idx="minor">
+                <a:schemeClr val="lt1"/>
+              </a:fontRef>
+            </p:style>
+            <p:txBody>
+              <a:bodyPr rtlCol="0" anchor="ctr"/>
+              <a:lstStyle/>
+              <a:p>
+                <a:pPr algn="ctr"/>
+                <a:endParaRPr lang="en-US"/>
+              </a:p>
+            </p:txBody>
+          </p:sp>
+          <p:cxnSp>
+            <p:nvCxnSpPr>
+              <p:cNvPr id="31" name="Straight Arrow Connector 10">
+                <a:extLst>
+                  <a:ext uri="{FF2B5EF4-FFF2-40B4-BE49-F238E27FC236}">
+                    <a16:creationId xmlns:a16="http://schemas.microsoft.com/office/drawing/2014/main" id="{0C5089E4-387D-EACB-D614-E14CC14BDFCF}"/>
+                  </a:ext>
+                </a:extLst>
+              </p:cNvPr>
+              <p:cNvCxnSpPr>
+                <a:cxnSpLocks/>
+                <a:stCxn id="3" idx="0"/>
+                <a:endCxn id="30" idx="3"/>
+              </p:cNvCxnSpPr>
+              <p:nvPr/>
+            </p:nvCxnSpPr>
+            <p:spPr>
+              <a:xfrm rot="16200000" flipV="1">
+                <a:off x="5306345" y="1734270"/>
+                <a:ext cx="2601072" cy="2863661"/>
+              </a:xfrm>
+              <a:prstGeom prst="bentConnector2">
+                <a:avLst/>
+              </a:prstGeom>
+              <a:ln w="28575">
+                <a:solidFill>
+                  <a:schemeClr val="tx1"/>
+                </a:solidFill>
+                <a:tailEnd type="triangle"/>
+              </a:ln>
+            </p:spPr>
+            <p:style>
+              <a:lnRef idx="1">
+                <a:schemeClr val="accent1"/>
+              </a:lnRef>
+              <a:fillRef idx="0">
+                <a:schemeClr val="accent1"/>
+              </a:fillRef>
+              <a:effectRef idx="0">
+                <a:schemeClr val="accent1"/>
+              </a:effectRef>
+              <a:fontRef idx="minor">
+                <a:schemeClr val="tx1"/>
+              </a:fontRef>
+            </p:style>
+          </p:cxnSp>
+          <p:cxnSp>
+            <p:nvCxnSpPr>
+              <p:cNvPr id="34" name="Straight Arrow Connector 10">
+                <a:extLst>
+                  <a:ext uri="{FF2B5EF4-FFF2-40B4-BE49-F238E27FC236}">
+                    <a16:creationId xmlns:a16="http://schemas.microsoft.com/office/drawing/2014/main" id="{3889A15D-F58C-2170-B69D-8E69B64DEC19}"/>
+                  </a:ext>
+                </a:extLst>
+              </p:cNvPr>
+              <p:cNvCxnSpPr>
+                <a:cxnSpLocks/>
+              </p:cNvCxnSpPr>
+              <p:nvPr/>
+            </p:nvCxnSpPr>
+            <p:spPr>
+              <a:xfrm rot="16200000" flipH="1">
+                <a:off x="1119095" y="564523"/>
+                <a:ext cx="28873" cy="1836107"/>
+              </a:xfrm>
+              <a:prstGeom prst="bentConnector4">
+                <a:avLst>
+                  <a:gd name="adj1" fmla="val -3079001"/>
+                  <a:gd name="adj2" fmla="val 99305"/>
+                </a:avLst>
+              </a:prstGeom>
+              <a:ln w="28575">
+                <a:solidFill>
+                  <a:schemeClr val="tx1"/>
+                </a:solidFill>
+                <a:tailEnd type="triangle"/>
+              </a:ln>
+            </p:spPr>
+            <p:style>
+              <a:lnRef idx="1">
+                <a:schemeClr val="accent1"/>
+              </a:lnRef>
+              <a:fillRef idx="0">
+                <a:schemeClr val="accent1"/>
+              </a:fillRef>
+              <a:effectRef idx="0">
+                <a:schemeClr val="accent1"/>
+              </a:effectRef>
+              <a:fontRef idx="minor">
+                <a:schemeClr val="tx1"/>
+              </a:fontRef>
+            </p:style>
+          </p:cxnSp>
+        </p:grpSp>
+      </p:grpSp>
+    </p:spTree>
+    <p:extLst>
+      <p:ext uri="{BB962C8B-B14F-4D97-AF65-F5344CB8AC3E}">
+        <p14:creationId xmlns:p14="http://schemas.microsoft.com/office/powerpoint/2010/main" val="89498928"/>
+      </p:ext>
+    </p:extLst>
+  </p:cSld>
+  <p:clrMapOvr>
+    <a:masterClrMapping/>
+  </p:clrMapOvr>
+</p:sld>
+</file>
+
 <file path=ppt/slides/slide2.xml><?xml version="1.0" encoding="utf-8"?>
 <p:sld xmlns:a="http://schemas.openxmlformats.org/drawingml/2006/main" xmlns:r="http://schemas.openxmlformats.org/officeDocument/2006/relationships" xmlns:p="http://schemas.openxmlformats.org/presentationml/2006/main">
   <p:cSld>

</xml_diff>

<commit_message>
added other stuffs to functions
</commit_message>
<xml_diff>
--- a/assets/diagrams_pool.pptx
+++ b/assets/diagrams_pool.pptx
@@ -24,6 +24,8 @@
     <p:sldId id="274" r:id="rId18"/>
     <p:sldId id="275" r:id="rId19"/>
     <p:sldId id="276" r:id="rId20"/>
+    <p:sldId id="278" r:id="rId21"/>
+    <p:sldId id="279" r:id="rId22"/>
   </p:sldIdLst>
   <p:sldSz cx="12192000" cy="6858000"/>
   <p:notesSz cx="7315200" cy="9601200"/>
@@ -277,7 +279,7 @@
           <a:p>
             <a:fld id="{CA113627-5753-4E5F-853E-B64920B5A820}" type="datetimeFigureOut">
               <a:rPr lang="en-US" smtClean="0"/>
-              <a:t>12/11/2024</a:t>
+              <a:t>12/15/2024</a:t>
             </a:fld>
             <a:endParaRPr lang="en-US"/>
           </a:p>
@@ -475,7 +477,7 @@
           <a:p>
             <a:fld id="{CA113627-5753-4E5F-853E-B64920B5A820}" type="datetimeFigureOut">
               <a:rPr lang="en-US" smtClean="0"/>
-              <a:t>12/11/2024</a:t>
+              <a:t>12/15/2024</a:t>
             </a:fld>
             <a:endParaRPr lang="en-US"/>
           </a:p>
@@ -683,7 +685,7 @@
           <a:p>
             <a:fld id="{CA113627-5753-4E5F-853E-B64920B5A820}" type="datetimeFigureOut">
               <a:rPr lang="en-US" smtClean="0"/>
-              <a:t>12/11/2024</a:t>
+              <a:t>12/15/2024</a:t>
             </a:fld>
             <a:endParaRPr lang="en-US"/>
           </a:p>
@@ -881,7 +883,7 @@
           <a:p>
             <a:fld id="{CA113627-5753-4E5F-853E-B64920B5A820}" type="datetimeFigureOut">
               <a:rPr lang="en-US" smtClean="0"/>
-              <a:t>12/11/2024</a:t>
+              <a:t>12/15/2024</a:t>
             </a:fld>
             <a:endParaRPr lang="en-US"/>
           </a:p>
@@ -1156,7 +1158,7 @@
           <a:p>
             <a:fld id="{CA113627-5753-4E5F-853E-B64920B5A820}" type="datetimeFigureOut">
               <a:rPr lang="en-US" smtClean="0"/>
-              <a:t>12/11/2024</a:t>
+              <a:t>12/15/2024</a:t>
             </a:fld>
             <a:endParaRPr lang="en-US"/>
           </a:p>
@@ -1421,7 +1423,7 @@
           <a:p>
             <a:fld id="{CA113627-5753-4E5F-853E-B64920B5A820}" type="datetimeFigureOut">
               <a:rPr lang="en-US" smtClean="0"/>
-              <a:t>12/11/2024</a:t>
+              <a:t>12/15/2024</a:t>
             </a:fld>
             <a:endParaRPr lang="en-US"/>
           </a:p>
@@ -1833,7 +1835,7 @@
           <a:p>
             <a:fld id="{CA113627-5753-4E5F-853E-B64920B5A820}" type="datetimeFigureOut">
               <a:rPr lang="en-US" smtClean="0"/>
-              <a:t>12/11/2024</a:t>
+              <a:t>12/15/2024</a:t>
             </a:fld>
             <a:endParaRPr lang="en-US"/>
           </a:p>
@@ -1974,7 +1976,7 @@
           <a:p>
             <a:fld id="{CA113627-5753-4E5F-853E-B64920B5A820}" type="datetimeFigureOut">
               <a:rPr lang="en-US" smtClean="0"/>
-              <a:t>12/11/2024</a:t>
+              <a:t>12/15/2024</a:t>
             </a:fld>
             <a:endParaRPr lang="en-US"/>
           </a:p>
@@ -2087,7 +2089,7 @@
           <a:p>
             <a:fld id="{CA113627-5753-4E5F-853E-B64920B5A820}" type="datetimeFigureOut">
               <a:rPr lang="en-US" smtClean="0"/>
-              <a:t>12/11/2024</a:t>
+              <a:t>12/15/2024</a:t>
             </a:fld>
             <a:endParaRPr lang="en-US"/>
           </a:p>
@@ -2398,7 +2400,7 @@
           <a:p>
             <a:fld id="{CA113627-5753-4E5F-853E-B64920B5A820}" type="datetimeFigureOut">
               <a:rPr lang="en-US" smtClean="0"/>
-              <a:t>12/11/2024</a:t>
+              <a:t>12/15/2024</a:t>
             </a:fld>
             <a:endParaRPr lang="en-US"/>
           </a:p>
@@ -2686,7 +2688,7 @@
           <a:p>
             <a:fld id="{CA113627-5753-4E5F-853E-B64920B5A820}" type="datetimeFigureOut">
               <a:rPr lang="en-US" smtClean="0"/>
-              <a:t>12/11/2024</a:t>
+              <a:t>12/15/2024</a:t>
             </a:fld>
             <a:endParaRPr lang="en-US"/>
           </a:p>
@@ -2927,7 +2929,7 @@
           <a:p>
             <a:fld id="{CA113627-5753-4E5F-853E-B64920B5A820}" type="datetimeFigureOut">
               <a:rPr lang="en-US" smtClean="0"/>
-              <a:t>12/11/2024</a:t>
+              <a:t>12/15/2024</a:t>
             </a:fld>
             <a:endParaRPr lang="en-US"/>
           </a:p>
@@ -19512,6 +19514,1114 @@
     <p:extLst>
       <p:ext uri="{BB962C8B-B14F-4D97-AF65-F5344CB8AC3E}">
         <p14:creationId xmlns:p14="http://schemas.microsoft.com/office/powerpoint/2010/main" val="3378319185"/>
+      </p:ext>
+    </p:extLst>
+  </p:cSld>
+  <p:clrMapOvr>
+    <a:masterClrMapping/>
+  </p:clrMapOvr>
+</p:sld>
+</file>
+
+<file path=ppt/slides/slide20.xml><?xml version="1.0" encoding="utf-8"?>
+<p:sld xmlns:a="http://schemas.openxmlformats.org/drawingml/2006/main" xmlns:r="http://schemas.openxmlformats.org/officeDocument/2006/relationships" xmlns:p="http://schemas.openxmlformats.org/presentationml/2006/main">
+  <p:cSld>
+    <p:spTree>
+      <p:nvGrpSpPr>
+        <p:cNvPr id="1" name="">
+          <a:extLst>
+            <a:ext uri="{FF2B5EF4-FFF2-40B4-BE49-F238E27FC236}">
+              <a16:creationId xmlns:a16="http://schemas.microsoft.com/office/drawing/2014/main" id="{D89B6515-C672-E369-E22F-8C8A93B0D3A1}"/>
+            </a:ext>
+          </a:extLst>
+        </p:cNvPr>
+        <p:cNvGrpSpPr/>
+        <p:nvPr/>
+      </p:nvGrpSpPr>
+      <p:grpSpPr>
+        <a:xfrm>
+          <a:off x="0" y="0"/>
+          <a:ext cx="0" cy="0"/>
+          <a:chOff x="0" y="0"/>
+          <a:chExt cx="0" cy="0"/>
+        </a:xfrm>
+      </p:grpSpPr>
+      <p:sp>
+        <p:nvSpPr>
+          <p:cNvPr id="58" name="TextBox 57">
+            <a:extLst>
+              <a:ext uri="{FF2B5EF4-FFF2-40B4-BE49-F238E27FC236}">
+                <a16:creationId xmlns:a16="http://schemas.microsoft.com/office/drawing/2014/main" id="{6B79B8F4-206F-042D-E212-B1171EE3B0FA}"/>
+              </a:ext>
+            </a:extLst>
+          </p:cNvPr>
+          <p:cNvSpPr txBox="1"/>
+          <p:nvPr/>
+        </p:nvSpPr>
+        <p:spPr>
+          <a:xfrm>
+            <a:off x="908966" y="4556684"/>
+            <a:ext cx="9781079" cy="461665"/>
+          </a:xfrm>
+          <a:prstGeom prst="rect">
+            <a:avLst/>
+          </a:prstGeom>
+          <a:noFill/>
+        </p:spPr>
+        <p:txBody>
+          <a:bodyPr wrap="square" rtlCol="0">
+            <a:spAutoFit/>
+          </a:bodyPr>
+          <a:lstStyle/>
+          <a:p>
+            <a:r>
+              <a:rPr lang="en-US" sz="2400" b="1" dirty="0"/>
+              <a:t>Fig.</a:t>
+            </a:r>
+            <a:r>
+              <a:rPr lang="en-US" sz="2400" dirty="0"/>
+              <a:t> 8.1 shows Python function definition and function call</a:t>
+            </a:r>
+          </a:p>
+        </p:txBody>
+      </p:sp>
+      <p:sp>
+        <p:nvSpPr>
+          <p:cNvPr id="36" name="TextBox 35">
+            <a:extLst>
+              <a:ext uri="{FF2B5EF4-FFF2-40B4-BE49-F238E27FC236}">
+                <a16:creationId xmlns:a16="http://schemas.microsoft.com/office/drawing/2014/main" id="{248E4E7B-F55F-A213-A6DC-012F8BCD3E7C}"/>
+              </a:ext>
+            </a:extLst>
+          </p:cNvPr>
+          <p:cNvSpPr txBox="1"/>
+          <p:nvPr/>
+        </p:nvSpPr>
+        <p:spPr>
+          <a:xfrm>
+            <a:off x="1660805" y="595998"/>
+            <a:ext cx="7292496" cy="4154984"/>
+          </a:xfrm>
+          <a:prstGeom prst="rect">
+            <a:avLst/>
+          </a:prstGeom>
+          <a:noFill/>
+        </p:spPr>
+        <p:txBody>
+          <a:bodyPr wrap="square">
+            <a:spAutoFit/>
+          </a:bodyPr>
+          <a:lstStyle/>
+          <a:p>
+            <a:br>
+              <a:rPr lang="en-US" sz="2400" b="0" dirty="0">
+                <a:solidFill>
+                  <a:srgbClr val="CCCCCC"/>
+                </a:solidFill>
+                <a:effectLst/>
+                <a:latin typeface="Consolas" panose="020B0609020204030204" pitchFamily="49" charset="0"/>
+              </a:rPr>
+            </a:br>
+            <a:r>
+              <a:rPr lang="en-US" sz="2400" b="0" dirty="0">
+                <a:solidFill>
+                  <a:srgbClr val="6A9955"/>
+                </a:solidFill>
+                <a:effectLst/>
+                <a:latin typeface="Consolas" panose="020B0609020204030204" pitchFamily="49" charset="0"/>
+              </a:rPr>
+              <a:t># Define a function</a:t>
+            </a:r>
+            <a:endParaRPr lang="en-US" sz="2400" b="0" dirty="0">
+              <a:solidFill>
+                <a:srgbClr val="CCCCCC"/>
+              </a:solidFill>
+              <a:effectLst/>
+              <a:latin typeface="Consolas" panose="020B0609020204030204" pitchFamily="49" charset="0"/>
+            </a:endParaRPr>
+          </a:p>
+          <a:p>
+            <a:r>
+              <a:rPr lang="en-US" sz="2400" b="0" dirty="0">
+                <a:solidFill>
+                  <a:srgbClr val="569CD6"/>
+                </a:solidFill>
+                <a:effectLst/>
+                <a:latin typeface="Consolas" panose="020B0609020204030204" pitchFamily="49" charset="0"/>
+              </a:rPr>
+              <a:t>def</a:t>
+            </a:r>
+            <a:r>
+              <a:rPr lang="en-US" sz="2400" b="0" dirty="0">
+                <a:solidFill>
+                  <a:srgbClr val="CCCCCC"/>
+                </a:solidFill>
+                <a:effectLst/>
+                <a:latin typeface="Consolas" panose="020B0609020204030204" pitchFamily="49" charset="0"/>
+              </a:rPr>
+              <a:t> </a:t>
+            </a:r>
+            <a:r>
+              <a:rPr lang="en-US" sz="2400" b="0" dirty="0">
+                <a:solidFill>
+                  <a:srgbClr val="DCDCAA"/>
+                </a:solidFill>
+                <a:effectLst/>
+                <a:latin typeface="Consolas" panose="020B0609020204030204" pitchFamily="49" charset="0"/>
+              </a:rPr>
+              <a:t>greet_user</a:t>
+            </a:r>
+            <a:r>
+              <a:rPr lang="en-US" sz="2400" b="0" dirty="0">
+                <a:solidFill>
+                  <a:srgbClr val="CCCCCC"/>
+                </a:solidFill>
+                <a:effectLst/>
+                <a:latin typeface="Consolas" panose="020B0609020204030204" pitchFamily="49" charset="0"/>
+              </a:rPr>
+              <a:t>():</a:t>
+            </a:r>
+          </a:p>
+          <a:p>
+            <a:r>
+              <a:rPr lang="en-US" sz="2400" b="0" dirty="0">
+                <a:solidFill>
+                  <a:srgbClr val="CCCCCC"/>
+                </a:solidFill>
+                <a:effectLst/>
+                <a:latin typeface="Consolas" panose="020B0609020204030204" pitchFamily="49" charset="0"/>
+              </a:rPr>
+              <a:t>    </a:t>
+            </a:r>
+            <a:r>
+              <a:rPr lang="en-US" sz="2400" b="0" dirty="0">
+                <a:solidFill>
+                  <a:srgbClr val="CE9178"/>
+                </a:solidFill>
+                <a:effectLst/>
+                <a:latin typeface="Consolas" panose="020B0609020204030204" pitchFamily="49" charset="0"/>
+              </a:rPr>
+              <a:t>"""Display a simple greeting."""</a:t>
+            </a:r>
+            <a:endParaRPr lang="en-US" sz="2400" b="0" dirty="0">
+              <a:solidFill>
+                <a:srgbClr val="CCCCCC"/>
+              </a:solidFill>
+              <a:effectLst/>
+              <a:latin typeface="Consolas" panose="020B0609020204030204" pitchFamily="49" charset="0"/>
+            </a:endParaRPr>
+          </a:p>
+          <a:p>
+            <a:r>
+              <a:rPr lang="en-US" sz="2400" b="0" dirty="0">
+                <a:solidFill>
+                  <a:srgbClr val="CCCCCC"/>
+                </a:solidFill>
+                <a:effectLst/>
+                <a:latin typeface="Consolas" panose="020B0609020204030204" pitchFamily="49" charset="0"/>
+              </a:rPr>
+              <a:t>    </a:t>
+            </a:r>
+            <a:r>
+              <a:rPr lang="en-US" sz="2400" b="0" dirty="0">
+                <a:solidFill>
+                  <a:srgbClr val="DCDCAA"/>
+                </a:solidFill>
+                <a:effectLst/>
+                <a:latin typeface="Consolas" panose="020B0609020204030204" pitchFamily="49" charset="0"/>
+              </a:rPr>
+              <a:t>print</a:t>
+            </a:r>
+            <a:r>
+              <a:rPr lang="en-US" sz="2400" b="0" dirty="0">
+                <a:solidFill>
+                  <a:srgbClr val="CCCCCC"/>
+                </a:solidFill>
+                <a:effectLst/>
+                <a:latin typeface="Consolas" panose="020B0609020204030204" pitchFamily="49" charset="0"/>
+              </a:rPr>
+              <a:t>(</a:t>
+            </a:r>
+            <a:r>
+              <a:rPr lang="en-US" sz="2400" b="0" dirty="0">
+                <a:solidFill>
+                  <a:srgbClr val="CE9178"/>
+                </a:solidFill>
+                <a:effectLst/>
+                <a:latin typeface="Consolas" panose="020B0609020204030204" pitchFamily="49" charset="0"/>
+              </a:rPr>
+              <a:t>"Hello!"</a:t>
+            </a:r>
+            <a:r>
+              <a:rPr lang="en-US" sz="2400" b="0" dirty="0">
+                <a:solidFill>
+                  <a:srgbClr val="CCCCCC"/>
+                </a:solidFill>
+                <a:effectLst/>
+                <a:latin typeface="Consolas" panose="020B0609020204030204" pitchFamily="49" charset="0"/>
+              </a:rPr>
+              <a:t>)</a:t>
+            </a:r>
+          </a:p>
+          <a:p>
+            <a:br>
+              <a:rPr lang="en-US" sz="2400" b="0" dirty="0">
+                <a:solidFill>
+                  <a:srgbClr val="CCCCCC"/>
+                </a:solidFill>
+                <a:effectLst/>
+                <a:latin typeface="Consolas" panose="020B0609020204030204" pitchFamily="49" charset="0"/>
+              </a:rPr>
+            </a:br>
+            <a:r>
+              <a:rPr lang="en-US" sz="2400" b="0" dirty="0">
+                <a:solidFill>
+                  <a:srgbClr val="6A9955"/>
+                </a:solidFill>
+                <a:effectLst/>
+                <a:latin typeface="Consolas" panose="020B0609020204030204" pitchFamily="49" charset="0"/>
+              </a:rPr>
+              <a:t># calling the function</a:t>
+            </a:r>
+            <a:endParaRPr lang="en-US" sz="2400" b="0" dirty="0">
+              <a:solidFill>
+                <a:srgbClr val="CCCCCC"/>
+              </a:solidFill>
+              <a:effectLst/>
+              <a:latin typeface="Consolas" panose="020B0609020204030204" pitchFamily="49" charset="0"/>
+            </a:endParaRPr>
+          </a:p>
+          <a:p>
+            <a:r>
+              <a:rPr lang="en-US" sz="2400" b="0" dirty="0">
+                <a:solidFill>
+                  <a:srgbClr val="DCDCAA"/>
+                </a:solidFill>
+                <a:effectLst/>
+                <a:latin typeface="Consolas" panose="020B0609020204030204" pitchFamily="49" charset="0"/>
+              </a:rPr>
+              <a:t>greet_user</a:t>
+            </a:r>
+            <a:r>
+              <a:rPr lang="en-US" sz="2400" b="0" dirty="0">
+                <a:solidFill>
+                  <a:srgbClr val="CCCCCC"/>
+                </a:solidFill>
+                <a:effectLst/>
+                <a:latin typeface="Consolas" panose="020B0609020204030204" pitchFamily="49" charset="0"/>
+              </a:rPr>
+              <a:t>()</a:t>
+            </a:r>
+          </a:p>
+          <a:p>
+            <a:endParaRPr lang="en-US" sz="2400" b="0" dirty="0">
+              <a:solidFill>
+                <a:srgbClr val="DCDCAA"/>
+              </a:solidFill>
+              <a:effectLst/>
+              <a:latin typeface="Consolas" panose="020B0609020204030204" pitchFamily="49" charset="0"/>
+            </a:endParaRPr>
+          </a:p>
+          <a:p>
+            <a:r>
+              <a:rPr lang="en-US" sz="2400" b="0" dirty="0">
+                <a:solidFill>
+                  <a:srgbClr val="DCDCAA"/>
+                </a:solidFill>
+                <a:effectLst/>
+                <a:latin typeface="Consolas" panose="020B0609020204030204" pitchFamily="49" charset="0"/>
+              </a:rPr>
+              <a:t>print</a:t>
+            </a:r>
+            <a:r>
+              <a:rPr lang="en-US" sz="2400" b="0" dirty="0">
+                <a:solidFill>
+                  <a:srgbClr val="CCCCCC"/>
+                </a:solidFill>
+                <a:effectLst/>
+                <a:latin typeface="Consolas" panose="020B0609020204030204" pitchFamily="49" charset="0"/>
+              </a:rPr>
+              <a:t>(</a:t>
+            </a:r>
+            <a:r>
+              <a:rPr lang="en-US" sz="2400" b="0" dirty="0">
+                <a:solidFill>
+                  <a:srgbClr val="CE9178"/>
+                </a:solidFill>
+                <a:effectLst/>
+                <a:latin typeface="Consolas" panose="020B0609020204030204" pitchFamily="49" charset="0"/>
+              </a:rPr>
+              <a:t>"Outside the function"</a:t>
+            </a:r>
+            <a:r>
+              <a:rPr lang="en-US" sz="2400" b="0" dirty="0">
+                <a:solidFill>
+                  <a:srgbClr val="CCCCCC"/>
+                </a:solidFill>
+                <a:effectLst/>
+                <a:latin typeface="Consolas" panose="020B0609020204030204" pitchFamily="49" charset="0"/>
+              </a:rPr>
+              <a:t>)</a:t>
+            </a:r>
+          </a:p>
+          <a:p>
+            <a:endParaRPr lang="en-US" sz="2400" b="0" dirty="0">
+              <a:solidFill>
+                <a:srgbClr val="CCCCCC"/>
+              </a:solidFill>
+              <a:effectLst/>
+              <a:latin typeface="Consolas" panose="020B0609020204030204" pitchFamily="49" charset="0"/>
+            </a:endParaRPr>
+          </a:p>
+        </p:txBody>
+      </p:sp>
+      <p:cxnSp>
+        <p:nvCxnSpPr>
+          <p:cNvPr id="2" name="Connector: Elbow 1">
+            <a:extLst>
+              <a:ext uri="{FF2B5EF4-FFF2-40B4-BE49-F238E27FC236}">
+                <a16:creationId xmlns:a16="http://schemas.microsoft.com/office/drawing/2014/main" id="{9B64A319-9A59-EAB0-909D-A124088113A0}"/>
+              </a:ext>
+            </a:extLst>
+          </p:cNvPr>
+          <p:cNvCxnSpPr>
+            <a:cxnSpLocks/>
+          </p:cNvCxnSpPr>
+          <p:nvPr/>
+        </p:nvCxnSpPr>
+        <p:spPr>
+          <a:xfrm flipV="1">
+            <a:off x="3728714" y="1575306"/>
+            <a:ext cx="853441" cy="1820987"/>
+          </a:xfrm>
+          <a:prstGeom prst="bentConnector3">
+            <a:avLst>
+              <a:gd name="adj1" fmla="val 491071"/>
+            </a:avLst>
+          </a:prstGeom>
+          <a:ln w="28575">
+            <a:solidFill>
+              <a:schemeClr val="accent1"/>
+            </a:solidFill>
+            <a:tailEnd type="triangle"/>
+          </a:ln>
+        </p:spPr>
+        <p:style>
+          <a:lnRef idx="1">
+            <a:schemeClr val="accent1"/>
+          </a:lnRef>
+          <a:fillRef idx="0">
+            <a:schemeClr val="accent1"/>
+          </a:fillRef>
+          <a:effectRef idx="0">
+            <a:schemeClr val="accent1"/>
+          </a:effectRef>
+          <a:fontRef idx="minor">
+            <a:schemeClr val="tx1"/>
+          </a:fontRef>
+        </p:style>
+      </p:cxnSp>
+      <p:cxnSp>
+        <p:nvCxnSpPr>
+          <p:cNvPr id="11" name="Straight Arrow Connector 10">
+            <a:extLst>
+              <a:ext uri="{FF2B5EF4-FFF2-40B4-BE49-F238E27FC236}">
+                <a16:creationId xmlns:a16="http://schemas.microsoft.com/office/drawing/2014/main" id="{50992CDD-E9F7-6814-BC90-320F3697E2BF}"/>
+              </a:ext>
+            </a:extLst>
+          </p:cNvPr>
+          <p:cNvCxnSpPr/>
+          <p:nvPr/>
+        </p:nvCxnSpPr>
+        <p:spPr>
+          <a:xfrm>
+            <a:off x="1457605" y="1486972"/>
+            <a:ext cx="0" cy="1005840"/>
+          </a:xfrm>
+          <a:prstGeom prst="straightConnector1">
+            <a:avLst/>
+          </a:prstGeom>
+          <a:ln w="28575">
+            <a:solidFill>
+              <a:schemeClr val="accent1"/>
+            </a:solidFill>
+            <a:tailEnd type="triangle"/>
+          </a:ln>
+        </p:spPr>
+        <p:style>
+          <a:lnRef idx="1">
+            <a:schemeClr val="accent1"/>
+          </a:lnRef>
+          <a:fillRef idx="0">
+            <a:schemeClr val="accent1"/>
+          </a:fillRef>
+          <a:effectRef idx="0">
+            <a:schemeClr val="accent1"/>
+          </a:effectRef>
+          <a:fontRef idx="minor">
+            <a:schemeClr val="tx1"/>
+          </a:fontRef>
+        </p:style>
+      </p:cxnSp>
+      <p:cxnSp>
+        <p:nvCxnSpPr>
+          <p:cNvPr id="12" name="Connector: Elbow 11">
+            <a:extLst>
+              <a:ext uri="{FF2B5EF4-FFF2-40B4-BE49-F238E27FC236}">
+                <a16:creationId xmlns:a16="http://schemas.microsoft.com/office/drawing/2014/main" id="{F50D1E03-2807-D5BE-B5EC-33D245BDB69F}"/>
+              </a:ext>
+            </a:extLst>
+          </p:cNvPr>
+          <p:cNvCxnSpPr>
+            <a:cxnSpLocks/>
+          </p:cNvCxnSpPr>
+          <p:nvPr/>
+        </p:nvCxnSpPr>
+        <p:spPr>
+          <a:xfrm rot="5400000">
+            <a:off x="1353290" y="2969433"/>
+            <a:ext cx="1488790" cy="812800"/>
+          </a:xfrm>
+          <a:prstGeom prst="bentConnector4">
+            <a:avLst>
+              <a:gd name="adj1" fmla="val -670"/>
+              <a:gd name="adj2" fmla="val 128125"/>
+            </a:avLst>
+          </a:prstGeom>
+          <a:ln w="28575">
+            <a:solidFill>
+              <a:schemeClr val="accent1"/>
+            </a:solidFill>
+            <a:tailEnd type="triangle"/>
+          </a:ln>
+        </p:spPr>
+        <p:style>
+          <a:lnRef idx="1">
+            <a:schemeClr val="accent1"/>
+          </a:lnRef>
+          <a:fillRef idx="0">
+            <a:schemeClr val="accent1"/>
+          </a:fillRef>
+          <a:effectRef idx="0">
+            <a:schemeClr val="accent1"/>
+          </a:effectRef>
+          <a:fontRef idx="minor">
+            <a:schemeClr val="tx1"/>
+          </a:fontRef>
+        </p:style>
+      </p:cxnSp>
+      <p:sp>
+        <p:nvSpPr>
+          <p:cNvPr id="25" name="Oval 24">
+            <a:extLst>
+              <a:ext uri="{FF2B5EF4-FFF2-40B4-BE49-F238E27FC236}">
+                <a16:creationId xmlns:a16="http://schemas.microsoft.com/office/drawing/2014/main" id="{F3A2F388-56FA-B75B-3CA5-3216FF7271E6}"/>
+              </a:ext>
+            </a:extLst>
+          </p:cNvPr>
+          <p:cNvSpPr/>
+          <p:nvPr/>
+        </p:nvSpPr>
+        <p:spPr>
+          <a:xfrm>
+            <a:off x="7993181" y="2264212"/>
+            <a:ext cx="457200" cy="457200"/>
+          </a:xfrm>
+          <a:prstGeom prst="ellipse">
+            <a:avLst/>
+          </a:prstGeom>
+        </p:spPr>
+        <p:style>
+          <a:lnRef idx="2">
+            <a:schemeClr val="accent1">
+              <a:shade val="15000"/>
+            </a:schemeClr>
+          </a:lnRef>
+          <a:fillRef idx="1">
+            <a:schemeClr val="accent1"/>
+          </a:fillRef>
+          <a:effectRef idx="0">
+            <a:schemeClr val="accent1"/>
+          </a:effectRef>
+          <a:fontRef idx="minor">
+            <a:schemeClr val="lt1"/>
+          </a:fontRef>
+        </p:style>
+        <p:txBody>
+          <a:bodyPr rtlCol="0" anchor="ctr"/>
+          <a:lstStyle/>
+          <a:p>
+            <a:pPr algn="ctr"/>
+            <a:r>
+              <a:rPr lang="en-US" dirty="0"/>
+              <a:t>1</a:t>
+            </a:r>
+          </a:p>
+        </p:txBody>
+      </p:sp>
+      <p:sp>
+        <p:nvSpPr>
+          <p:cNvPr id="26" name="Oval 25">
+            <a:extLst>
+              <a:ext uri="{FF2B5EF4-FFF2-40B4-BE49-F238E27FC236}">
+                <a16:creationId xmlns:a16="http://schemas.microsoft.com/office/drawing/2014/main" id="{D9F8F1A7-4CDE-64C9-8787-1D177E86A1E8}"/>
+              </a:ext>
+            </a:extLst>
+          </p:cNvPr>
+          <p:cNvSpPr/>
+          <p:nvPr/>
+        </p:nvSpPr>
+        <p:spPr>
+          <a:xfrm>
+            <a:off x="908966" y="1761292"/>
+            <a:ext cx="457200" cy="457200"/>
+          </a:xfrm>
+          <a:prstGeom prst="ellipse">
+            <a:avLst/>
+          </a:prstGeom>
+        </p:spPr>
+        <p:style>
+          <a:lnRef idx="2">
+            <a:schemeClr val="accent1">
+              <a:shade val="15000"/>
+            </a:schemeClr>
+          </a:lnRef>
+          <a:fillRef idx="1">
+            <a:schemeClr val="accent1"/>
+          </a:fillRef>
+          <a:effectRef idx="0">
+            <a:schemeClr val="accent1"/>
+          </a:effectRef>
+          <a:fontRef idx="minor">
+            <a:schemeClr val="lt1"/>
+          </a:fontRef>
+        </p:style>
+        <p:txBody>
+          <a:bodyPr rtlCol="0" anchor="ctr"/>
+          <a:lstStyle/>
+          <a:p>
+            <a:pPr algn="ctr"/>
+            <a:r>
+              <a:rPr lang="en-US" dirty="0"/>
+              <a:t>2</a:t>
+            </a:r>
+          </a:p>
+        </p:txBody>
+      </p:sp>
+      <p:sp>
+        <p:nvSpPr>
+          <p:cNvPr id="27" name="Oval 26">
+            <a:extLst>
+              <a:ext uri="{FF2B5EF4-FFF2-40B4-BE49-F238E27FC236}">
+                <a16:creationId xmlns:a16="http://schemas.microsoft.com/office/drawing/2014/main" id="{D18BFF58-FA40-FA39-30D6-B08F1DE6BB60}"/>
+              </a:ext>
+            </a:extLst>
+          </p:cNvPr>
+          <p:cNvSpPr/>
+          <p:nvPr/>
+        </p:nvSpPr>
+        <p:spPr>
+          <a:xfrm>
+            <a:off x="919126" y="3130721"/>
+            <a:ext cx="457200" cy="457200"/>
+          </a:xfrm>
+          <a:prstGeom prst="ellipse">
+            <a:avLst/>
+          </a:prstGeom>
+        </p:spPr>
+        <p:style>
+          <a:lnRef idx="2">
+            <a:schemeClr val="accent1">
+              <a:shade val="15000"/>
+            </a:schemeClr>
+          </a:lnRef>
+          <a:fillRef idx="1">
+            <a:schemeClr val="accent1"/>
+          </a:fillRef>
+          <a:effectRef idx="0">
+            <a:schemeClr val="accent1"/>
+          </a:effectRef>
+          <a:fontRef idx="minor">
+            <a:schemeClr val="lt1"/>
+          </a:fontRef>
+        </p:style>
+        <p:txBody>
+          <a:bodyPr rtlCol="0" anchor="ctr"/>
+          <a:lstStyle/>
+          <a:p>
+            <a:pPr algn="ctr"/>
+            <a:r>
+              <a:rPr lang="en-US" dirty="0"/>
+              <a:t>3</a:t>
+            </a:r>
+          </a:p>
+        </p:txBody>
+      </p:sp>
+    </p:spTree>
+    <p:extLst>
+      <p:ext uri="{BB962C8B-B14F-4D97-AF65-F5344CB8AC3E}">
+        <p14:creationId xmlns:p14="http://schemas.microsoft.com/office/powerpoint/2010/main" val="1837038640"/>
+      </p:ext>
+    </p:extLst>
+  </p:cSld>
+  <p:clrMapOvr>
+    <a:masterClrMapping/>
+  </p:clrMapOvr>
+</p:sld>
+</file>
+
+<file path=ppt/slides/slide21.xml><?xml version="1.0" encoding="utf-8"?>
+<p:sld xmlns:a="http://schemas.openxmlformats.org/drawingml/2006/main" xmlns:r="http://schemas.openxmlformats.org/officeDocument/2006/relationships" xmlns:p="http://schemas.openxmlformats.org/presentationml/2006/main">
+  <p:cSld>
+    <p:spTree>
+      <p:nvGrpSpPr>
+        <p:cNvPr id="1" name="">
+          <a:extLst>
+            <a:ext uri="{FF2B5EF4-FFF2-40B4-BE49-F238E27FC236}">
+              <a16:creationId xmlns:a16="http://schemas.microsoft.com/office/drawing/2014/main" id="{7361530D-D820-3BEF-05C5-87E86696BDA8}"/>
+            </a:ext>
+          </a:extLst>
+        </p:cNvPr>
+        <p:cNvGrpSpPr/>
+        <p:nvPr/>
+      </p:nvGrpSpPr>
+      <p:grpSpPr>
+        <a:xfrm>
+          <a:off x="0" y="0"/>
+          <a:ext cx="0" cy="0"/>
+          <a:chOff x="0" y="0"/>
+          <a:chExt cx="0" cy="0"/>
+        </a:xfrm>
+      </p:grpSpPr>
+      <p:sp>
+        <p:nvSpPr>
+          <p:cNvPr id="58" name="TextBox 57">
+            <a:extLst>
+              <a:ext uri="{FF2B5EF4-FFF2-40B4-BE49-F238E27FC236}">
+                <a16:creationId xmlns:a16="http://schemas.microsoft.com/office/drawing/2014/main" id="{0F0BB1EC-9E6F-A26F-B134-3E71C21C3D81}"/>
+              </a:ext>
+            </a:extLst>
+          </p:cNvPr>
+          <p:cNvSpPr txBox="1"/>
+          <p:nvPr/>
+        </p:nvSpPr>
+        <p:spPr>
+          <a:xfrm>
+            <a:off x="1345846" y="3318453"/>
+            <a:ext cx="9781079" cy="461665"/>
+          </a:xfrm>
+          <a:prstGeom prst="rect">
+            <a:avLst/>
+          </a:prstGeom>
+          <a:noFill/>
+        </p:spPr>
+        <p:txBody>
+          <a:bodyPr wrap="square" rtlCol="0">
+            <a:spAutoFit/>
+          </a:bodyPr>
+          <a:lstStyle/>
+          <a:p>
+            <a:r>
+              <a:rPr lang="en-US" sz="2400" b="1" dirty="0"/>
+              <a:t>Fig.</a:t>
+            </a:r>
+            <a:r>
+              <a:rPr lang="en-US" sz="2400" dirty="0"/>
+              <a:t> 8.2 Passing Information to a Function </a:t>
+            </a:r>
+          </a:p>
+        </p:txBody>
+      </p:sp>
+      <p:sp>
+        <p:nvSpPr>
+          <p:cNvPr id="36" name="TextBox 35">
+            <a:extLst>
+              <a:ext uri="{FF2B5EF4-FFF2-40B4-BE49-F238E27FC236}">
+                <a16:creationId xmlns:a16="http://schemas.microsoft.com/office/drawing/2014/main" id="{87B290F2-9BB2-AB0B-6343-7EFDAA9BF2FD}"/>
+              </a:ext>
+            </a:extLst>
+          </p:cNvPr>
+          <p:cNvSpPr txBox="1"/>
+          <p:nvPr/>
+        </p:nvSpPr>
+        <p:spPr>
+          <a:xfrm>
+            <a:off x="1660805" y="595998"/>
+            <a:ext cx="7292496" cy="2308324"/>
+          </a:xfrm>
+          <a:prstGeom prst="rect">
+            <a:avLst/>
+          </a:prstGeom>
+          <a:noFill/>
+        </p:spPr>
+        <p:txBody>
+          <a:bodyPr wrap="square">
+            <a:spAutoFit/>
+          </a:bodyPr>
+          <a:lstStyle/>
+          <a:p>
+            <a:r>
+              <a:rPr lang="en-US" sz="2400" b="0" dirty="0">
+                <a:solidFill>
+                  <a:srgbClr val="569CD6"/>
+                </a:solidFill>
+                <a:effectLst/>
+                <a:latin typeface="Consolas" panose="020B0609020204030204" pitchFamily="49" charset="0"/>
+              </a:rPr>
+              <a:t>def</a:t>
+            </a:r>
+            <a:r>
+              <a:rPr lang="en-US" sz="2400" b="0" dirty="0">
+                <a:solidFill>
+                  <a:srgbClr val="CCCCCC"/>
+                </a:solidFill>
+                <a:effectLst/>
+                <a:latin typeface="Consolas" panose="020B0609020204030204" pitchFamily="49" charset="0"/>
+              </a:rPr>
+              <a:t> </a:t>
+            </a:r>
+            <a:r>
+              <a:rPr lang="en-US" sz="2400" b="0" dirty="0">
+                <a:solidFill>
+                  <a:srgbClr val="DCDCAA"/>
+                </a:solidFill>
+                <a:effectLst/>
+                <a:latin typeface="Consolas" panose="020B0609020204030204" pitchFamily="49" charset="0"/>
+              </a:rPr>
+              <a:t>greet_user</a:t>
+            </a:r>
+            <a:r>
+              <a:rPr lang="en-US" sz="2400" b="0" dirty="0">
+                <a:solidFill>
+                  <a:srgbClr val="CCCCCC"/>
+                </a:solidFill>
+                <a:effectLst/>
+                <a:latin typeface="Consolas" panose="020B0609020204030204" pitchFamily="49" charset="0"/>
+              </a:rPr>
+              <a:t>(</a:t>
+            </a:r>
+            <a:r>
+              <a:rPr lang="en-US" sz="2400" b="0" dirty="0">
+                <a:solidFill>
+                  <a:srgbClr val="9CDCFE"/>
+                </a:solidFill>
+                <a:effectLst/>
+                <a:latin typeface="Consolas" panose="020B0609020204030204" pitchFamily="49" charset="0"/>
+              </a:rPr>
+              <a:t>username</a:t>
+            </a:r>
+            <a:r>
+              <a:rPr lang="en-US" sz="2400" b="0" dirty="0">
+                <a:solidFill>
+                  <a:srgbClr val="CCCCCC"/>
+                </a:solidFill>
+                <a:effectLst/>
+                <a:latin typeface="Consolas" panose="020B0609020204030204" pitchFamily="49" charset="0"/>
+              </a:rPr>
+              <a:t>):</a:t>
+            </a:r>
+          </a:p>
+          <a:p>
+            <a:r>
+              <a:rPr lang="en-US" sz="2400" b="0" dirty="0">
+                <a:solidFill>
+                  <a:srgbClr val="CCCCCC"/>
+                </a:solidFill>
+                <a:effectLst/>
+                <a:latin typeface="Consolas" panose="020B0609020204030204" pitchFamily="49" charset="0"/>
+              </a:rPr>
+              <a:t>    </a:t>
+            </a:r>
+            <a:r>
+              <a:rPr lang="en-US" sz="2400" b="0" dirty="0">
+                <a:solidFill>
+                  <a:srgbClr val="CE9178"/>
+                </a:solidFill>
+                <a:effectLst/>
+                <a:latin typeface="Consolas" panose="020B0609020204030204" pitchFamily="49" charset="0"/>
+              </a:rPr>
+              <a:t>"""Display a simple greeting."""</a:t>
+            </a:r>
+            <a:endParaRPr lang="en-US" sz="2400" b="0" dirty="0">
+              <a:solidFill>
+                <a:srgbClr val="CCCCCC"/>
+              </a:solidFill>
+              <a:effectLst/>
+              <a:latin typeface="Consolas" panose="020B0609020204030204" pitchFamily="49" charset="0"/>
+            </a:endParaRPr>
+          </a:p>
+          <a:p>
+            <a:r>
+              <a:rPr lang="en-US" sz="2400" b="0" dirty="0">
+                <a:solidFill>
+                  <a:srgbClr val="CCCCCC"/>
+                </a:solidFill>
+                <a:effectLst/>
+                <a:latin typeface="Consolas" panose="020B0609020204030204" pitchFamily="49" charset="0"/>
+              </a:rPr>
+              <a:t>    </a:t>
+            </a:r>
+            <a:r>
+              <a:rPr lang="en-US" sz="2400" b="0" dirty="0">
+                <a:solidFill>
+                  <a:srgbClr val="DCDCAA"/>
+                </a:solidFill>
+                <a:effectLst/>
+                <a:latin typeface="Consolas" panose="020B0609020204030204" pitchFamily="49" charset="0"/>
+              </a:rPr>
+              <a:t>print</a:t>
+            </a:r>
+            <a:r>
+              <a:rPr lang="en-US" sz="2400" b="0" dirty="0">
+                <a:solidFill>
+                  <a:srgbClr val="CCCCCC"/>
+                </a:solidFill>
+                <a:effectLst/>
+                <a:latin typeface="Consolas" panose="020B0609020204030204" pitchFamily="49" charset="0"/>
+              </a:rPr>
+              <a:t>(</a:t>
+            </a:r>
+            <a:r>
+              <a:rPr lang="en-US" sz="2400" b="0" dirty="0" err="1">
+                <a:solidFill>
+                  <a:srgbClr val="569CD6"/>
+                </a:solidFill>
+                <a:effectLst/>
+                <a:latin typeface="Consolas" panose="020B0609020204030204" pitchFamily="49" charset="0"/>
+              </a:rPr>
+              <a:t>f</a:t>
+            </a:r>
+            <a:r>
+              <a:rPr lang="en-US" sz="2400" b="0" dirty="0" err="1">
+                <a:solidFill>
+                  <a:srgbClr val="CE9178"/>
+                </a:solidFill>
+                <a:effectLst/>
+                <a:latin typeface="Consolas" panose="020B0609020204030204" pitchFamily="49" charset="0"/>
+              </a:rPr>
+              <a:t>"Hello</a:t>
+            </a:r>
+            <a:r>
+              <a:rPr lang="en-US" sz="2400" b="0" dirty="0">
+                <a:solidFill>
+                  <a:srgbClr val="CE9178"/>
+                </a:solidFill>
+                <a:effectLst/>
+                <a:latin typeface="Consolas" panose="020B0609020204030204" pitchFamily="49" charset="0"/>
+              </a:rPr>
+              <a:t>, </a:t>
+            </a:r>
+            <a:r>
+              <a:rPr lang="en-US" sz="2400" b="0" dirty="0">
+                <a:solidFill>
+                  <a:srgbClr val="569CD6"/>
+                </a:solidFill>
+                <a:effectLst/>
+                <a:latin typeface="Consolas" panose="020B0609020204030204" pitchFamily="49" charset="0"/>
+              </a:rPr>
+              <a:t>{</a:t>
+            </a:r>
+            <a:r>
+              <a:rPr lang="en-US" sz="2400" b="0" dirty="0" err="1">
+                <a:solidFill>
+                  <a:srgbClr val="9CDCFE"/>
+                </a:solidFill>
+                <a:effectLst/>
+                <a:latin typeface="Consolas" panose="020B0609020204030204" pitchFamily="49" charset="0"/>
+              </a:rPr>
+              <a:t>username</a:t>
+            </a:r>
+            <a:r>
+              <a:rPr lang="en-US" sz="2400" b="0" dirty="0" err="1">
+                <a:solidFill>
+                  <a:srgbClr val="CCCCCC"/>
+                </a:solidFill>
+                <a:effectLst/>
+                <a:latin typeface="Consolas" panose="020B0609020204030204" pitchFamily="49" charset="0"/>
+              </a:rPr>
+              <a:t>.title</a:t>
+            </a:r>
+            <a:r>
+              <a:rPr lang="en-US" sz="2400" b="0" dirty="0">
+                <a:solidFill>
+                  <a:srgbClr val="CCCCCC"/>
+                </a:solidFill>
+                <a:effectLst/>
+                <a:latin typeface="Consolas" panose="020B0609020204030204" pitchFamily="49" charset="0"/>
+              </a:rPr>
+              <a:t>()</a:t>
+            </a:r>
+            <a:r>
+              <a:rPr lang="en-US" sz="2400" b="0" dirty="0">
+                <a:solidFill>
+                  <a:srgbClr val="569CD6"/>
+                </a:solidFill>
+                <a:effectLst/>
+                <a:latin typeface="Consolas" panose="020B0609020204030204" pitchFamily="49" charset="0"/>
+              </a:rPr>
+              <a:t>}</a:t>
+            </a:r>
+            <a:r>
+              <a:rPr lang="en-US" sz="2400" b="0" dirty="0">
+                <a:solidFill>
+                  <a:srgbClr val="CE9178"/>
+                </a:solidFill>
+                <a:effectLst/>
+                <a:latin typeface="Consolas" panose="020B0609020204030204" pitchFamily="49" charset="0"/>
+              </a:rPr>
+              <a:t>!"</a:t>
+            </a:r>
+            <a:r>
+              <a:rPr lang="en-US" sz="2400" b="0" dirty="0">
+                <a:solidFill>
+                  <a:srgbClr val="CCCCCC"/>
+                </a:solidFill>
+                <a:effectLst/>
+                <a:latin typeface="Consolas" panose="020B0609020204030204" pitchFamily="49" charset="0"/>
+              </a:rPr>
+              <a:t>)</a:t>
+            </a:r>
+          </a:p>
+          <a:p>
+            <a:br>
+              <a:rPr lang="en-US" sz="2400" b="0" dirty="0">
+                <a:solidFill>
+                  <a:srgbClr val="CCCCCC"/>
+                </a:solidFill>
+                <a:effectLst/>
+                <a:latin typeface="Consolas" panose="020B0609020204030204" pitchFamily="49" charset="0"/>
+              </a:rPr>
+            </a:br>
+            <a:r>
+              <a:rPr lang="en-US" sz="2400" b="0" dirty="0">
+                <a:solidFill>
+                  <a:srgbClr val="DCDCAA"/>
+                </a:solidFill>
+                <a:effectLst/>
+                <a:latin typeface="Consolas" panose="020B0609020204030204" pitchFamily="49" charset="0"/>
+              </a:rPr>
+              <a:t>greet_user</a:t>
+            </a:r>
+            <a:r>
+              <a:rPr lang="en-US" sz="2400" b="0" dirty="0">
+                <a:solidFill>
+                  <a:srgbClr val="CCCCCC"/>
+                </a:solidFill>
+                <a:effectLst/>
+                <a:latin typeface="Consolas" panose="020B0609020204030204" pitchFamily="49" charset="0"/>
+              </a:rPr>
+              <a:t>(</a:t>
+            </a:r>
+            <a:r>
+              <a:rPr lang="en-US" sz="2400" b="0" dirty="0">
+                <a:solidFill>
+                  <a:srgbClr val="CE9178"/>
+                </a:solidFill>
+                <a:effectLst/>
+                <a:latin typeface="Consolas" panose="020B0609020204030204" pitchFamily="49" charset="0"/>
+              </a:rPr>
+              <a:t>'</a:t>
+            </a:r>
+            <a:r>
+              <a:rPr lang="en-US" sz="2400" b="0" dirty="0" err="1">
+                <a:solidFill>
+                  <a:srgbClr val="CE9178"/>
+                </a:solidFill>
+                <a:effectLst/>
+                <a:latin typeface="Consolas" panose="020B0609020204030204" pitchFamily="49" charset="0"/>
+              </a:rPr>
+              <a:t>jesse</a:t>
+            </a:r>
+            <a:r>
+              <a:rPr lang="en-US" sz="2400" b="0" dirty="0">
+                <a:solidFill>
+                  <a:srgbClr val="CE9178"/>
+                </a:solidFill>
+                <a:effectLst/>
+                <a:latin typeface="Consolas" panose="020B0609020204030204" pitchFamily="49" charset="0"/>
+              </a:rPr>
+              <a:t>'</a:t>
+            </a:r>
+            <a:r>
+              <a:rPr lang="en-US" sz="2400" b="0" dirty="0">
+                <a:solidFill>
+                  <a:srgbClr val="CCCCCC"/>
+                </a:solidFill>
+                <a:effectLst/>
+                <a:latin typeface="Consolas" panose="020B0609020204030204" pitchFamily="49" charset="0"/>
+              </a:rPr>
+              <a:t>)</a:t>
+            </a:r>
+          </a:p>
+          <a:p>
+            <a:endParaRPr lang="en-US" sz="2400" b="0" dirty="0">
+              <a:solidFill>
+                <a:srgbClr val="CCCCCC"/>
+              </a:solidFill>
+              <a:effectLst/>
+              <a:latin typeface="Consolas" panose="020B0609020204030204" pitchFamily="49" charset="0"/>
+            </a:endParaRPr>
+          </a:p>
+        </p:txBody>
+      </p:sp>
+      <p:sp>
+        <p:nvSpPr>
+          <p:cNvPr id="5" name="Arc 4">
+            <a:extLst>
+              <a:ext uri="{FF2B5EF4-FFF2-40B4-BE49-F238E27FC236}">
+                <a16:creationId xmlns:a16="http://schemas.microsoft.com/office/drawing/2014/main" id="{CA4D697B-E32E-A696-BE6E-2ED33229EC2C}"/>
+              </a:ext>
+            </a:extLst>
+          </p:cNvPr>
+          <p:cNvSpPr/>
+          <p:nvPr/>
+        </p:nvSpPr>
+        <p:spPr>
+          <a:xfrm flipV="1">
+            <a:off x="4358641" y="181867"/>
+            <a:ext cx="4704080" cy="2934213"/>
+          </a:xfrm>
+          <a:prstGeom prst="arc">
+            <a:avLst>
+              <a:gd name="adj1" fmla="val 11948294"/>
+              <a:gd name="adj2" fmla="val 9155440"/>
+            </a:avLst>
+          </a:prstGeom>
+          <a:ln w="28575">
+            <a:solidFill>
+              <a:schemeClr val="accent1"/>
+            </a:solidFill>
+            <a:headEnd type="none" w="med" len="med"/>
+            <a:tailEnd type="arrow" w="med" len="med"/>
+          </a:ln>
+        </p:spPr>
+        <p:style>
+          <a:lnRef idx="1">
+            <a:schemeClr val="accent1"/>
+          </a:lnRef>
+          <a:fillRef idx="0">
+            <a:schemeClr val="accent1"/>
+          </a:fillRef>
+          <a:effectRef idx="0">
+            <a:schemeClr val="accent1"/>
+          </a:effectRef>
+          <a:fontRef idx="minor">
+            <a:schemeClr val="tx1"/>
+          </a:fontRef>
+        </p:style>
+        <p:txBody>
+          <a:bodyPr rtlCol="0" anchor="ctr"/>
+          <a:lstStyle/>
+          <a:p>
+            <a:pPr algn="ctr"/>
+            <a:endParaRPr lang="en-US"/>
+          </a:p>
+        </p:txBody>
+      </p:sp>
+    </p:spTree>
+    <p:extLst>
+      <p:ext uri="{BB962C8B-B14F-4D97-AF65-F5344CB8AC3E}">
+        <p14:creationId xmlns:p14="http://schemas.microsoft.com/office/powerpoint/2010/main" val="2200235430"/>
       </p:ext>
     </p:extLst>
   </p:cSld>

</xml_diff>

<commit_message>
pushing updates to chapter 8 and 9
</commit_message>
<xml_diff>
--- a/assets/diagrams_pool.pptx
+++ b/assets/diagrams_pool.pptx
@@ -26,6 +26,10 @@
     <p:sldId id="276" r:id="rId20"/>
     <p:sldId id="278" r:id="rId21"/>
     <p:sldId id="279" r:id="rId22"/>
+    <p:sldId id="280" r:id="rId23"/>
+    <p:sldId id="281" r:id="rId24"/>
+    <p:sldId id="283" r:id="rId25"/>
+    <p:sldId id="282" r:id="rId26"/>
   </p:sldIdLst>
   <p:sldSz cx="12192000" cy="6858000"/>
   <p:notesSz cx="7315200" cy="9601200"/>
@@ -279,7 +283,7 @@
           <a:p>
             <a:fld id="{CA113627-5753-4E5F-853E-B64920B5A820}" type="datetimeFigureOut">
               <a:rPr lang="en-US" smtClean="0"/>
-              <a:t>12/15/2024</a:t>
+              <a:t>12/21/2024</a:t>
             </a:fld>
             <a:endParaRPr lang="en-US"/>
           </a:p>
@@ -477,7 +481,7 @@
           <a:p>
             <a:fld id="{CA113627-5753-4E5F-853E-B64920B5A820}" type="datetimeFigureOut">
               <a:rPr lang="en-US" smtClean="0"/>
-              <a:t>12/15/2024</a:t>
+              <a:t>12/21/2024</a:t>
             </a:fld>
             <a:endParaRPr lang="en-US"/>
           </a:p>
@@ -685,7 +689,7 @@
           <a:p>
             <a:fld id="{CA113627-5753-4E5F-853E-B64920B5A820}" type="datetimeFigureOut">
               <a:rPr lang="en-US" smtClean="0"/>
-              <a:t>12/15/2024</a:t>
+              <a:t>12/21/2024</a:t>
             </a:fld>
             <a:endParaRPr lang="en-US"/>
           </a:p>
@@ -883,7 +887,7 @@
           <a:p>
             <a:fld id="{CA113627-5753-4E5F-853E-B64920B5A820}" type="datetimeFigureOut">
               <a:rPr lang="en-US" smtClean="0"/>
-              <a:t>12/15/2024</a:t>
+              <a:t>12/21/2024</a:t>
             </a:fld>
             <a:endParaRPr lang="en-US"/>
           </a:p>
@@ -1158,7 +1162,7 @@
           <a:p>
             <a:fld id="{CA113627-5753-4E5F-853E-B64920B5A820}" type="datetimeFigureOut">
               <a:rPr lang="en-US" smtClean="0"/>
-              <a:t>12/15/2024</a:t>
+              <a:t>12/21/2024</a:t>
             </a:fld>
             <a:endParaRPr lang="en-US"/>
           </a:p>
@@ -1423,7 +1427,7 @@
           <a:p>
             <a:fld id="{CA113627-5753-4E5F-853E-B64920B5A820}" type="datetimeFigureOut">
               <a:rPr lang="en-US" smtClean="0"/>
-              <a:t>12/15/2024</a:t>
+              <a:t>12/21/2024</a:t>
             </a:fld>
             <a:endParaRPr lang="en-US"/>
           </a:p>
@@ -1835,7 +1839,7 @@
           <a:p>
             <a:fld id="{CA113627-5753-4E5F-853E-B64920B5A820}" type="datetimeFigureOut">
               <a:rPr lang="en-US" smtClean="0"/>
-              <a:t>12/15/2024</a:t>
+              <a:t>12/21/2024</a:t>
             </a:fld>
             <a:endParaRPr lang="en-US"/>
           </a:p>
@@ -1976,7 +1980,7 @@
           <a:p>
             <a:fld id="{CA113627-5753-4E5F-853E-B64920B5A820}" type="datetimeFigureOut">
               <a:rPr lang="en-US" smtClean="0"/>
-              <a:t>12/15/2024</a:t>
+              <a:t>12/21/2024</a:t>
             </a:fld>
             <a:endParaRPr lang="en-US"/>
           </a:p>
@@ -2089,7 +2093,7 @@
           <a:p>
             <a:fld id="{CA113627-5753-4E5F-853E-B64920B5A820}" type="datetimeFigureOut">
               <a:rPr lang="en-US" smtClean="0"/>
-              <a:t>12/15/2024</a:t>
+              <a:t>12/21/2024</a:t>
             </a:fld>
             <a:endParaRPr lang="en-US"/>
           </a:p>
@@ -2400,7 +2404,7 @@
           <a:p>
             <a:fld id="{CA113627-5753-4E5F-853E-B64920B5A820}" type="datetimeFigureOut">
               <a:rPr lang="en-US" smtClean="0"/>
-              <a:t>12/15/2024</a:t>
+              <a:t>12/21/2024</a:t>
             </a:fld>
             <a:endParaRPr lang="en-US"/>
           </a:p>
@@ -2688,7 +2692,7 @@
           <a:p>
             <a:fld id="{CA113627-5753-4E5F-853E-B64920B5A820}" type="datetimeFigureOut">
               <a:rPr lang="en-US" smtClean="0"/>
-              <a:t>12/15/2024</a:t>
+              <a:t>12/21/2024</a:t>
             </a:fld>
             <a:endParaRPr lang="en-US"/>
           </a:p>
@@ -2929,7 +2933,7 @@
           <a:p>
             <a:fld id="{CA113627-5753-4E5F-853E-B64920B5A820}" type="datetimeFigureOut">
               <a:rPr lang="en-US" smtClean="0"/>
-              <a:t>12/15/2024</a:t>
+              <a:t>12/21/2024</a:t>
             </a:fld>
             <a:endParaRPr lang="en-US"/>
           </a:p>
@@ -20622,6 +20626,550 @@
     <p:extLst>
       <p:ext uri="{BB962C8B-B14F-4D97-AF65-F5344CB8AC3E}">
         <p14:creationId xmlns:p14="http://schemas.microsoft.com/office/powerpoint/2010/main" val="2200235430"/>
+      </p:ext>
+    </p:extLst>
+  </p:cSld>
+  <p:clrMapOvr>
+    <a:masterClrMapping/>
+  </p:clrMapOvr>
+</p:sld>
+</file>
+
+<file path=ppt/slides/slide22.xml><?xml version="1.0" encoding="utf-8"?>
+<p:sld xmlns:a="http://schemas.openxmlformats.org/drawingml/2006/main" xmlns:r="http://schemas.openxmlformats.org/officeDocument/2006/relationships" xmlns:p="http://schemas.openxmlformats.org/presentationml/2006/main">
+  <p:cSld>
+    <p:spTree>
+      <p:nvGrpSpPr>
+        <p:cNvPr id="1" name=""/>
+        <p:cNvGrpSpPr/>
+        <p:nvPr/>
+      </p:nvGrpSpPr>
+      <p:grpSpPr>
+        <a:xfrm>
+          <a:off x="0" y="0"/>
+          <a:ext cx="0" cy="0"/>
+          <a:chOff x="0" y="0"/>
+          <a:chExt cx="0" cy="0"/>
+        </a:xfrm>
+      </p:grpSpPr>
+      <p:pic>
+        <p:nvPicPr>
+          <p:cNvPr id="5" name="Picture 4">
+            <a:extLst>
+              <a:ext uri="{FF2B5EF4-FFF2-40B4-BE49-F238E27FC236}">
+                <a16:creationId xmlns:a16="http://schemas.microsoft.com/office/drawing/2014/main" id="{98466AF1-A124-6776-E683-0C2D7927DF20}"/>
+              </a:ext>
+            </a:extLst>
+          </p:cNvPr>
+          <p:cNvPicPr>
+            <a:picLocks noChangeAspect="1"/>
+          </p:cNvPicPr>
+          <p:nvPr/>
+        </p:nvPicPr>
+        <p:blipFill>
+          <a:blip r:embed="rId2">
+            <a:extLst>
+              <a:ext uri="{28A0092B-C50C-407E-A947-70E740481C1C}">
+                <a14:useLocalDpi xmlns:a14="http://schemas.microsoft.com/office/drawing/2010/main" val="0"/>
+              </a:ext>
+            </a:extLst>
+          </a:blip>
+          <a:stretch>
+            <a:fillRect/>
+          </a:stretch>
+        </p:blipFill>
+        <p:spPr>
+          <a:xfrm>
+            <a:off x="6283222" y="924663"/>
+            <a:ext cx="3994355" cy="4013406"/>
+          </a:xfrm>
+          <a:prstGeom prst="rect">
+            <a:avLst/>
+          </a:prstGeom>
+        </p:spPr>
+      </p:pic>
+      <p:pic>
+        <p:nvPicPr>
+          <p:cNvPr id="7" name="Picture 6">
+            <a:extLst>
+              <a:ext uri="{FF2B5EF4-FFF2-40B4-BE49-F238E27FC236}">
+                <a16:creationId xmlns:a16="http://schemas.microsoft.com/office/drawing/2014/main" id="{3518C22C-06C3-FD0E-A823-A156A6707805}"/>
+              </a:ext>
+            </a:extLst>
+          </p:cNvPr>
+          <p:cNvPicPr>
+            <a:picLocks noChangeAspect="1"/>
+          </p:cNvPicPr>
+          <p:nvPr/>
+        </p:nvPicPr>
+        <p:blipFill>
+          <a:blip r:embed="rId3">
+            <a:extLst>
+              <a:ext uri="{28A0092B-C50C-407E-A947-70E740481C1C}">
+                <a14:useLocalDpi xmlns:a14="http://schemas.microsoft.com/office/drawing/2010/main" val="0"/>
+              </a:ext>
+            </a:extLst>
+          </a:blip>
+          <a:srcRect l="8856" t="14668" r="8093" b="19555"/>
+          <a:stretch/>
+        </p:blipFill>
+        <p:spPr>
+          <a:xfrm>
+            <a:off x="2883163" y="924663"/>
+            <a:ext cx="3283958" cy="4104232"/>
+          </a:xfrm>
+          <a:prstGeom prst="rect">
+            <a:avLst/>
+          </a:prstGeom>
+        </p:spPr>
+      </p:pic>
+      <p:sp>
+        <p:nvSpPr>
+          <p:cNvPr id="8" name="Rectangle 7">
+            <a:extLst>
+              <a:ext uri="{FF2B5EF4-FFF2-40B4-BE49-F238E27FC236}">
+                <a16:creationId xmlns:a16="http://schemas.microsoft.com/office/drawing/2014/main" id="{DB6EEFC7-41F3-91D4-1E99-C0AA3DB2E66A}"/>
+              </a:ext>
+            </a:extLst>
+          </p:cNvPr>
+          <p:cNvSpPr/>
+          <p:nvPr/>
+        </p:nvSpPr>
+        <p:spPr>
+          <a:xfrm>
+            <a:off x="9652000" y="924663"/>
+            <a:ext cx="625577" cy="690777"/>
+          </a:xfrm>
+          <a:prstGeom prst="rect">
+            <a:avLst/>
+          </a:prstGeom>
+          <a:solidFill>
+            <a:srgbClr val="E8E8E7"/>
+          </a:solidFill>
+          <a:ln>
+            <a:noFill/>
+          </a:ln>
+        </p:spPr>
+        <p:style>
+          <a:lnRef idx="2">
+            <a:schemeClr val="accent1">
+              <a:shade val="15000"/>
+            </a:schemeClr>
+          </a:lnRef>
+          <a:fillRef idx="1">
+            <a:schemeClr val="accent1"/>
+          </a:fillRef>
+          <a:effectRef idx="0">
+            <a:schemeClr val="accent1"/>
+          </a:effectRef>
+          <a:fontRef idx="minor">
+            <a:schemeClr val="lt1"/>
+          </a:fontRef>
+        </p:style>
+        <p:txBody>
+          <a:bodyPr rtlCol="0" anchor="ctr"/>
+          <a:lstStyle/>
+          <a:p>
+            <a:pPr algn="ctr"/>
+            <a:endParaRPr lang="en-US"/>
+          </a:p>
+        </p:txBody>
+      </p:sp>
+    </p:spTree>
+    <p:extLst>
+      <p:ext uri="{BB962C8B-B14F-4D97-AF65-F5344CB8AC3E}">
+        <p14:creationId xmlns:p14="http://schemas.microsoft.com/office/powerpoint/2010/main" val="3941985290"/>
+      </p:ext>
+    </p:extLst>
+  </p:cSld>
+  <p:clrMapOvr>
+    <a:masterClrMapping/>
+  </p:clrMapOvr>
+</p:sld>
+</file>
+
+<file path=ppt/slides/slide23.xml><?xml version="1.0" encoding="utf-8"?>
+<p:sld xmlns:a="http://schemas.openxmlformats.org/drawingml/2006/main" xmlns:r="http://schemas.openxmlformats.org/officeDocument/2006/relationships" xmlns:p="http://schemas.openxmlformats.org/presentationml/2006/main">
+  <p:cSld>
+    <p:spTree>
+      <p:nvGrpSpPr>
+        <p:cNvPr id="1" name="">
+          <a:extLst>
+            <a:ext uri="{FF2B5EF4-FFF2-40B4-BE49-F238E27FC236}">
+              <a16:creationId xmlns:a16="http://schemas.microsoft.com/office/drawing/2014/main" id="{9BDB83AA-2C7B-DC40-4F5A-B210243BBB0D}"/>
+            </a:ext>
+          </a:extLst>
+        </p:cNvPr>
+        <p:cNvGrpSpPr/>
+        <p:nvPr/>
+      </p:nvGrpSpPr>
+      <p:grpSpPr>
+        <a:xfrm>
+          <a:off x="0" y="0"/>
+          <a:ext cx="0" cy="0"/>
+          <a:chOff x="0" y="0"/>
+          <a:chExt cx="0" cy="0"/>
+        </a:xfrm>
+      </p:grpSpPr>
+      <p:pic>
+        <p:nvPicPr>
+          <p:cNvPr id="3" name="Picture 2">
+            <a:extLst>
+              <a:ext uri="{FF2B5EF4-FFF2-40B4-BE49-F238E27FC236}">
+                <a16:creationId xmlns:a16="http://schemas.microsoft.com/office/drawing/2014/main" id="{98010A5D-3FBE-8208-A5BC-EA61DE661D39}"/>
+              </a:ext>
+            </a:extLst>
+          </p:cNvPr>
+          <p:cNvPicPr>
+            <a:picLocks noChangeAspect="1"/>
+          </p:cNvPicPr>
+          <p:nvPr/>
+        </p:nvPicPr>
+        <p:blipFill>
+          <a:blip r:embed="rId2">
+            <a:extLst>
+              <a:ext uri="{28A0092B-C50C-407E-A947-70E740481C1C}">
+                <a14:useLocalDpi xmlns:a14="http://schemas.microsoft.com/office/drawing/2010/main" val="0"/>
+              </a:ext>
+            </a:extLst>
+          </a:blip>
+          <a:stretch>
+            <a:fillRect/>
+          </a:stretch>
+        </p:blipFill>
+        <p:spPr>
+          <a:xfrm>
+            <a:off x="1183639" y="827087"/>
+            <a:ext cx="9213979" cy="4903153"/>
+          </a:xfrm>
+          <a:prstGeom prst="rect">
+            <a:avLst/>
+          </a:prstGeom>
+        </p:spPr>
+      </p:pic>
+    </p:spTree>
+    <p:extLst>
+      <p:ext uri="{BB962C8B-B14F-4D97-AF65-F5344CB8AC3E}">
+        <p14:creationId xmlns:p14="http://schemas.microsoft.com/office/powerpoint/2010/main" val="511525927"/>
+      </p:ext>
+    </p:extLst>
+  </p:cSld>
+  <p:clrMapOvr>
+    <a:masterClrMapping/>
+  </p:clrMapOvr>
+</p:sld>
+</file>
+
+<file path=ppt/slides/slide24.xml><?xml version="1.0" encoding="utf-8"?>
+<p:sld xmlns:a="http://schemas.openxmlformats.org/drawingml/2006/main" xmlns:r="http://schemas.openxmlformats.org/officeDocument/2006/relationships" xmlns:p="http://schemas.openxmlformats.org/presentationml/2006/main">
+  <p:cSld>
+    <p:spTree>
+      <p:nvGrpSpPr>
+        <p:cNvPr id="1" name="">
+          <a:extLst>
+            <a:ext uri="{FF2B5EF4-FFF2-40B4-BE49-F238E27FC236}">
+              <a16:creationId xmlns:a16="http://schemas.microsoft.com/office/drawing/2014/main" id="{117C2E1A-A348-FE1C-7890-508542B3C656}"/>
+            </a:ext>
+          </a:extLst>
+        </p:cNvPr>
+        <p:cNvGrpSpPr/>
+        <p:nvPr/>
+      </p:nvGrpSpPr>
+      <p:grpSpPr>
+        <a:xfrm>
+          <a:off x="0" y="0"/>
+          <a:ext cx="0" cy="0"/>
+          <a:chOff x="0" y="0"/>
+          <a:chExt cx="0" cy="0"/>
+        </a:xfrm>
+      </p:grpSpPr>
+      <p:pic>
+        <p:nvPicPr>
+          <p:cNvPr id="3" name="Picture 2">
+            <a:extLst>
+              <a:ext uri="{FF2B5EF4-FFF2-40B4-BE49-F238E27FC236}">
+                <a16:creationId xmlns:a16="http://schemas.microsoft.com/office/drawing/2014/main" id="{F223AA3B-FC22-9415-41B4-C8F916D05A61}"/>
+              </a:ext>
+            </a:extLst>
+          </p:cNvPr>
+          <p:cNvPicPr>
+            <a:picLocks noChangeAspect="1"/>
+          </p:cNvPicPr>
+          <p:nvPr/>
+        </p:nvPicPr>
+        <p:blipFill>
+          <a:blip r:embed="rId2">
+            <a:extLst>
+              <a:ext uri="{28A0092B-C50C-407E-A947-70E740481C1C}">
+                <a14:useLocalDpi xmlns:a14="http://schemas.microsoft.com/office/drawing/2010/main" val="0"/>
+              </a:ext>
+            </a:extLst>
+          </a:blip>
+          <a:srcRect l="3473" t="4061" r="62013" b="44136"/>
+          <a:stretch/>
+        </p:blipFill>
+        <p:spPr>
+          <a:xfrm>
+            <a:off x="1503680" y="1026160"/>
+            <a:ext cx="3180080" cy="2540000"/>
+          </a:xfrm>
+          <a:prstGeom prst="rect">
+            <a:avLst/>
+          </a:prstGeom>
+        </p:spPr>
+      </p:pic>
+      <p:sp>
+        <p:nvSpPr>
+          <p:cNvPr id="2" name="Oval 1">
+            <a:extLst>
+              <a:ext uri="{FF2B5EF4-FFF2-40B4-BE49-F238E27FC236}">
+                <a16:creationId xmlns:a16="http://schemas.microsoft.com/office/drawing/2014/main" id="{46E9067F-5F0B-4109-D883-BED1D5BA354B}"/>
+              </a:ext>
+            </a:extLst>
+          </p:cNvPr>
+          <p:cNvSpPr/>
+          <p:nvPr/>
+        </p:nvSpPr>
+        <p:spPr>
+          <a:xfrm>
+            <a:off x="4490720" y="2641600"/>
+            <a:ext cx="386080" cy="355600"/>
+          </a:xfrm>
+          <a:prstGeom prst="ellipse">
+            <a:avLst/>
+          </a:prstGeom>
+          <a:solidFill>
+            <a:srgbClr val="FCFEFB"/>
+          </a:solidFill>
+          <a:ln>
+            <a:noFill/>
+          </a:ln>
+        </p:spPr>
+        <p:style>
+          <a:lnRef idx="2">
+            <a:schemeClr val="accent1">
+              <a:shade val="15000"/>
+            </a:schemeClr>
+          </a:lnRef>
+          <a:fillRef idx="1">
+            <a:schemeClr val="accent1"/>
+          </a:fillRef>
+          <a:effectRef idx="0">
+            <a:schemeClr val="accent1"/>
+          </a:effectRef>
+          <a:fontRef idx="minor">
+            <a:schemeClr val="lt1"/>
+          </a:fontRef>
+        </p:style>
+        <p:txBody>
+          <a:bodyPr rtlCol="0" anchor="ctr"/>
+          <a:lstStyle/>
+          <a:p>
+            <a:pPr algn="ctr"/>
+            <a:endParaRPr lang="en-US"/>
+          </a:p>
+        </p:txBody>
+      </p:sp>
+    </p:spTree>
+    <p:extLst>
+      <p:ext uri="{BB962C8B-B14F-4D97-AF65-F5344CB8AC3E}">
+        <p14:creationId xmlns:p14="http://schemas.microsoft.com/office/powerpoint/2010/main" val="457937762"/>
+      </p:ext>
+    </p:extLst>
+  </p:cSld>
+  <p:clrMapOvr>
+    <a:masterClrMapping/>
+  </p:clrMapOvr>
+</p:sld>
+</file>
+
+<file path=ppt/slides/slide25.xml><?xml version="1.0" encoding="utf-8"?>
+<p:sld xmlns:a="http://schemas.openxmlformats.org/drawingml/2006/main" xmlns:r="http://schemas.openxmlformats.org/officeDocument/2006/relationships" xmlns:p="http://schemas.openxmlformats.org/presentationml/2006/main">
+  <p:cSld>
+    <p:spTree>
+      <p:nvGrpSpPr>
+        <p:cNvPr id="1" name="">
+          <a:extLst>
+            <a:ext uri="{FF2B5EF4-FFF2-40B4-BE49-F238E27FC236}">
+              <a16:creationId xmlns:a16="http://schemas.microsoft.com/office/drawing/2014/main" id="{F5A69A34-7BED-1F9B-9049-54019865E1F5}"/>
+            </a:ext>
+          </a:extLst>
+        </p:cNvPr>
+        <p:cNvGrpSpPr/>
+        <p:nvPr/>
+      </p:nvGrpSpPr>
+      <p:grpSpPr>
+        <a:xfrm>
+          <a:off x="0" y="0"/>
+          <a:ext cx="0" cy="0"/>
+          <a:chOff x="0" y="0"/>
+          <a:chExt cx="0" cy="0"/>
+        </a:xfrm>
+      </p:grpSpPr>
+      <p:grpSp>
+        <p:nvGrpSpPr>
+          <p:cNvPr id="5" name="Group 4">
+            <a:extLst>
+              <a:ext uri="{FF2B5EF4-FFF2-40B4-BE49-F238E27FC236}">
+                <a16:creationId xmlns:a16="http://schemas.microsoft.com/office/drawing/2014/main" id="{6B069B1A-DEBE-7894-6D2C-8995410CB2C4}"/>
+              </a:ext>
+            </a:extLst>
+          </p:cNvPr>
+          <p:cNvGrpSpPr/>
+          <p:nvPr/>
+        </p:nvGrpSpPr>
+        <p:grpSpPr>
+          <a:xfrm>
+            <a:off x="5963920" y="827087"/>
+            <a:ext cx="3464560" cy="2759393"/>
+            <a:chOff x="5963920" y="827087"/>
+            <a:chExt cx="3464560" cy="2759393"/>
+          </a:xfrm>
+        </p:grpSpPr>
+        <p:pic>
+          <p:nvPicPr>
+            <p:cNvPr id="3" name="Picture 2">
+              <a:extLst>
+                <a:ext uri="{FF2B5EF4-FFF2-40B4-BE49-F238E27FC236}">
+                  <a16:creationId xmlns:a16="http://schemas.microsoft.com/office/drawing/2014/main" id="{EA4E83BB-8C42-87FB-D3A8-3052AEC6B2FE}"/>
+                </a:ext>
+              </a:extLst>
+            </p:cNvPr>
+            <p:cNvPicPr>
+              <a:picLocks noChangeAspect="1"/>
+            </p:cNvPicPr>
+            <p:nvPr/>
+          </p:nvPicPr>
+          <p:blipFill>
+            <a:blip r:embed="rId2">
+              <a:extLst>
+                <a:ext uri="{28A0092B-C50C-407E-A947-70E740481C1C}">
+                  <a14:useLocalDpi xmlns:a14="http://schemas.microsoft.com/office/drawing/2010/main" val="0"/>
+                </a:ext>
+              </a:extLst>
+            </a:blip>
+            <a:srcRect l="53313" r="10519" b="43722"/>
+            <a:stretch/>
+          </p:blipFill>
+          <p:spPr>
+            <a:xfrm>
+              <a:off x="6096000" y="827087"/>
+              <a:ext cx="3332480" cy="2759393"/>
+            </a:xfrm>
+            <a:prstGeom prst="rect">
+              <a:avLst/>
+            </a:prstGeom>
+          </p:spPr>
+        </p:pic>
+        <p:sp>
+          <p:nvSpPr>
+            <p:cNvPr id="2" name="Oval 1">
+              <a:extLst>
+                <a:ext uri="{FF2B5EF4-FFF2-40B4-BE49-F238E27FC236}">
+                  <a16:creationId xmlns:a16="http://schemas.microsoft.com/office/drawing/2014/main" id="{D34B7950-9E83-DB51-6122-B36D83933889}"/>
+                </a:ext>
+              </a:extLst>
+            </p:cNvPr>
+            <p:cNvSpPr/>
+            <p:nvPr/>
+          </p:nvSpPr>
+          <p:spPr>
+            <a:xfrm>
+              <a:off x="5963920" y="2499360"/>
+              <a:ext cx="375920" cy="558800"/>
+            </a:xfrm>
+            <a:prstGeom prst="ellipse">
+              <a:avLst/>
+            </a:prstGeom>
+            <a:solidFill>
+              <a:srgbClr val="FCFEFB"/>
+            </a:solidFill>
+            <a:ln>
+              <a:noFill/>
+            </a:ln>
+          </p:spPr>
+          <p:style>
+            <a:lnRef idx="2">
+              <a:schemeClr val="accent1">
+                <a:shade val="15000"/>
+              </a:schemeClr>
+            </a:lnRef>
+            <a:fillRef idx="1">
+              <a:schemeClr val="accent1"/>
+            </a:fillRef>
+            <a:effectRef idx="0">
+              <a:schemeClr val="accent1"/>
+            </a:effectRef>
+            <a:fontRef idx="minor">
+              <a:schemeClr val="lt1"/>
+            </a:fontRef>
+          </p:style>
+          <p:txBody>
+            <a:bodyPr rtlCol="0" anchor="ctr"/>
+            <a:lstStyle/>
+            <a:p>
+              <a:pPr algn="ctr"/>
+              <a:endParaRPr lang="en-US"/>
+            </a:p>
+          </p:txBody>
+        </p:sp>
+        <p:sp>
+          <p:nvSpPr>
+            <p:cNvPr id="4" name="Rectangle 3">
+              <a:extLst>
+                <a:ext uri="{FF2B5EF4-FFF2-40B4-BE49-F238E27FC236}">
+                  <a16:creationId xmlns:a16="http://schemas.microsoft.com/office/drawing/2014/main" id="{07E52A80-BAD0-F059-72FD-0B4D98BE0A4C}"/>
+                </a:ext>
+              </a:extLst>
+            </p:cNvPr>
+            <p:cNvSpPr/>
+            <p:nvPr/>
+          </p:nvSpPr>
+          <p:spPr>
+            <a:xfrm>
+              <a:off x="6858000" y="2306320"/>
+              <a:ext cx="985520" cy="345440"/>
+            </a:xfrm>
+            <a:prstGeom prst="rect">
+              <a:avLst/>
+            </a:prstGeom>
+            <a:solidFill>
+              <a:srgbClr val="FCFEFB"/>
+            </a:solidFill>
+            <a:ln>
+              <a:noFill/>
+            </a:ln>
+          </p:spPr>
+          <p:style>
+            <a:lnRef idx="2">
+              <a:schemeClr val="accent1">
+                <a:shade val="15000"/>
+              </a:schemeClr>
+            </a:lnRef>
+            <a:fillRef idx="1">
+              <a:schemeClr val="accent1"/>
+            </a:fillRef>
+            <a:effectRef idx="0">
+              <a:schemeClr val="accent1"/>
+            </a:effectRef>
+            <a:fontRef idx="minor">
+              <a:schemeClr val="lt1"/>
+            </a:fontRef>
+          </p:style>
+          <p:txBody>
+            <a:bodyPr rtlCol="0" anchor="ctr"/>
+            <a:lstStyle/>
+            <a:p>
+              <a:pPr algn="ctr"/>
+              <a:endParaRPr lang="en-US"/>
+            </a:p>
+          </p:txBody>
+        </p:sp>
+      </p:grpSp>
+    </p:spTree>
+    <p:extLst>
+      <p:ext uri="{BB962C8B-B14F-4D97-AF65-F5344CB8AC3E}">
+        <p14:creationId xmlns:p14="http://schemas.microsoft.com/office/powerpoint/2010/main" val="1824840789"/>
       </p:ext>
     </p:extLst>
   </p:cSld>

</xml_diff>